<commit_message>
Added final Gantt and Budget to Project Notebook
</commit_message>
<xml_diff>
--- a/Project Notebook - Group 4/Project Notebook - Group 4/4. Other/Budget.pptx
+++ b/Project Notebook - Group 4/Project Notebook - Group 4/4. Other/Budget.pptx
@@ -1,29 +1,30 @@
 
 <file path=ppt/presentation.xml><?xml version="1.0" encoding="utf-8"?>
-<p:presentation xmlns:a="http://schemas.openxmlformats.org/drawingml/2006/main" xmlns:r="http://schemas.openxmlformats.org/officeDocument/2006/relationships" xmlns:mc="http://schemas.openxmlformats.org/markup-compatibility/2006" xmlns:mv="urn:schemas-microsoft-com:mac:vml" xmlns:p="http://schemas.openxmlformats.org/presentationml/2006/main" xmlns:c="http://schemas.openxmlformats.org/drawingml/2006/chart" xmlns:dgm="http://schemas.openxmlformats.org/drawingml/2006/diagram" xmlns:o="urn:schemas-microsoft-com:office:office" xmlns:v="urn:schemas-microsoft-com:vml" xmlns:pvml="urn:schemas-microsoft-com:office:powerpoint" xmlns:com="http://schemas.openxmlformats.org/drawingml/2006/compatibility" xmlns:p14="http://schemas.microsoft.com/office/powerpoint/2010/main" xmlns:p15="http://schemas.microsoft.com/office/powerpoint/2012/main" autoCompressPictures="0" embedTrueTypeFonts="1" strictFirstAndLastChars="0" saveSubsetFonts="1">
+<p:presentation xmlns:a="http://schemas.openxmlformats.org/drawingml/2006/main" xmlns:r="http://schemas.openxmlformats.org/officeDocument/2006/relationships" xmlns:p="http://schemas.openxmlformats.org/presentationml/2006/main" strictFirstAndLastChars="0" embedTrueTypeFonts="1" saveSubsetFonts="1" autoCompressPictures="0">
   <p:sldMasterIdLst>
-    <p:sldMasterId id="2147483659" r:id="rId4"/>
+    <p:sldMasterId id="2147483659" r:id="rId1"/>
   </p:sldMasterIdLst>
   <p:notesMasterIdLst>
     <p:notesMasterId r:id="rId5"/>
   </p:notesMasterIdLst>
   <p:sldIdLst>
-    <p:sldId id="256" r:id="rId6"/>
-    <p:sldId id="257" r:id="rId7"/>
+    <p:sldId id="256" r:id="rId2"/>
+    <p:sldId id="257" r:id="rId3"/>
+    <p:sldId id="258" r:id="rId4"/>
   </p:sldIdLst>
-  <p:sldSz cy="5143500" cx="9144000"/>
+  <p:sldSz cx="9144000" cy="5143500" type="screen16x9"/>
   <p:notesSz cx="6858000" cy="9144000"/>
   <p:embeddedFontLst>
     <p:embeddedFont>
-      <p:font typeface="Lato"/>
-      <p:regular r:id="rId8"/>
-      <p:bold r:id="rId9"/>
-      <p:italic r:id="rId10"/>
-      <p:boldItalic r:id="rId11"/>
+      <p:font typeface="Lato" panose="020B0604020202020204" charset="0"/>
+      <p:regular r:id="rId6"/>
+      <p:bold r:id="rId7"/>
+      <p:italic r:id="rId8"/>
+      <p:boldItalic r:id="rId9"/>
     </p:embeddedFont>
   </p:embeddedFontLst>
   <p:defaultTextStyle>
-    <a:defPPr lvl="0" marR="0" rtl="0" algn="l">
+    <a:defPPr marR="0" lvl="0" algn="l" rtl="0">
       <a:lnSpc>
         <a:spcPct val="100000"/>
       </a:lnSpc>
@@ -34,7 +35,7 @@
         <a:spcPts val="0"/>
       </a:spcAft>
     </a:defPPr>
-    <a:lvl1pPr lvl="0" marR="0" rtl="0" algn="l">
+    <a:lvl1pPr marR="0" lvl="0" algn="l" rtl="0">
       <a:lnSpc>
         <a:spcPct val="100000"/>
       </a:lnSpc>
@@ -48,7 +49,7 @@
         <a:srgbClr val="000000"/>
       </a:buClr>
       <a:buFont typeface="Arial"/>
-      <a:defRPr b="0" i="0" sz="1400" u="none" cap="none" strike="noStrike">
+      <a:defRPr sz="1400" b="0" i="0" u="none" strike="noStrike" cap="none">
         <a:solidFill>
           <a:srgbClr val="000000"/>
         </a:solidFill>
@@ -58,7 +59,7 @@
         <a:sym typeface="Arial"/>
       </a:defRPr>
     </a:lvl1pPr>
-    <a:lvl2pPr lvl="1" marR="0" rtl="0" algn="l">
+    <a:lvl2pPr marR="0" lvl="1" algn="l" rtl="0">
       <a:lnSpc>
         <a:spcPct val="100000"/>
       </a:lnSpc>
@@ -72,7 +73,7 @@
         <a:srgbClr val="000000"/>
       </a:buClr>
       <a:buFont typeface="Arial"/>
-      <a:defRPr b="0" i="0" sz="1400" u="none" cap="none" strike="noStrike">
+      <a:defRPr sz="1400" b="0" i="0" u="none" strike="noStrike" cap="none">
         <a:solidFill>
           <a:srgbClr val="000000"/>
         </a:solidFill>
@@ -82,7 +83,7 @@
         <a:sym typeface="Arial"/>
       </a:defRPr>
     </a:lvl2pPr>
-    <a:lvl3pPr lvl="2" marR="0" rtl="0" algn="l">
+    <a:lvl3pPr marR="0" lvl="2" algn="l" rtl="0">
       <a:lnSpc>
         <a:spcPct val="100000"/>
       </a:lnSpc>
@@ -96,7 +97,7 @@
         <a:srgbClr val="000000"/>
       </a:buClr>
       <a:buFont typeface="Arial"/>
-      <a:defRPr b="0" i="0" sz="1400" u="none" cap="none" strike="noStrike">
+      <a:defRPr sz="1400" b="0" i="0" u="none" strike="noStrike" cap="none">
         <a:solidFill>
           <a:srgbClr val="000000"/>
         </a:solidFill>
@@ -106,7 +107,7 @@
         <a:sym typeface="Arial"/>
       </a:defRPr>
     </a:lvl3pPr>
-    <a:lvl4pPr lvl="3" marR="0" rtl="0" algn="l">
+    <a:lvl4pPr marR="0" lvl="3" algn="l" rtl="0">
       <a:lnSpc>
         <a:spcPct val="100000"/>
       </a:lnSpc>
@@ -120,7 +121,7 @@
         <a:srgbClr val="000000"/>
       </a:buClr>
       <a:buFont typeface="Arial"/>
-      <a:defRPr b="0" i="0" sz="1400" u="none" cap="none" strike="noStrike">
+      <a:defRPr sz="1400" b="0" i="0" u="none" strike="noStrike" cap="none">
         <a:solidFill>
           <a:srgbClr val="000000"/>
         </a:solidFill>
@@ -130,7 +131,7 @@
         <a:sym typeface="Arial"/>
       </a:defRPr>
     </a:lvl4pPr>
-    <a:lvl5pPr lvl="4" marR="0" rtl="0" algn="l">
+    <a:lvl5pPr marR="0" lvl="4" algn="l" rtl="0">
       <a:lnSpc>
         <a:spcPct val="100000"/>
       </a:lnSpc>
@@ -144,7 +145,7 @@
         <a:srgbClr val="000000"/>
       </a:buClr>
       <a:buFont typeface="Arial"/>
-      <a:defRPr b="0" i="0" sz="1400" u="none" cap="none" strike="noStrike">
+      <a:defRPr sz="1400" b="0" i="0" u="none" strike="noStrike" cap="none">
         <a:solidFill>
           <a:srgbClr val="000000"/>
         </a:solidFill>
@@ -154,7 +155,7 @@
         <a:sym typeface="Arial"/>
       </a:defRPr>
     </a:lvl5pPr>
-    <a:lvl6pPr lvl="5" marR="0" rtl="0" algn="l">
+    <a:lvl6pPr marR="0" lvl="5" algn="l" rtl="0">
       <a:lnSpc>
         <a:spcPct val="100000"/>
       </a:lnSpc>
@@ -168,7 +169,7 @@
         <a:srgbClr val="000000"/>
       </a:buClr>
       <a:buFont typeface="Arial"/>
-      <a:defRPr b="0" i="0" sz="1400" u="none" cap="none" strike="noStrike">
+      <a:defRPr sz="1400" b="0" i="0" u="none" strike="noStrike" cap="none">
         <a:solidFill>
           <a:srgbClr val="000000"/>
         </a:solidFill>
@@ -178,7 +179,7 @@
         <a:sym typeface="Arial"/>
       </a:defRPr>
     </a:lvl6pPr>
-    <a:lvl7pPr lvl="6" marR="0" rtl="0" algn="l">
+    <a:lvl7pPr marR="0" lvl="6" algn="l" rtl="0">
       <a:lnSpc>
         <a:spcPct val="100000"/>
       </a:lnSpc>
@@ -192,7 +193,7 @@
         <a:srgbClr val="000000"/>
       </a:buClr>
       <a:buFont typeface="Arial"/>
-      <a:defRPr b="0" i="0" sz="1400" u="none" cap="none" strike="noStrike">
+      <a:defRPr sz="1400" b="0" i="0" u="none" strike="noStrike" cap="none">
         <a:solidFill>
           <a:srgbClr val="000000"/>
         </a:solidFill>
@@ -202,7 +203,7 @@
         <a:sym typeface="Arial"/>
       </a:defRPr>
     </a:lvl7pPr>
-    <a:lvl8pPr lvl="7" marR="0" rtl="0" algn="l">
+    <a:lvl8pPr marR="0" lvl="7" algn="l" rtl="0">
       <a:lnSpc>
         <a:spcPct val="100000"/>
       </a:lnSpc>
@@ -216,7 +217,7 @@
         <a:srgbClr val="000000"/>
       </a:buClr>
       <a:buFont typeface="Arial"/>
-      <a:defRPr b="0" i="0" sz="1400" u="none" cap="none" strike="noStrike">
+      <a:defRPr sz="1400" b="0" i="0" u="none" strike="noStrike" cap="none">
         <a:solidFill>
           <a:srgbClr val="000000"/>
         </a:solidFill>
@@ -226,7 +227,7 @@
         <a:sym typeface="Arial"/>
       </a:defRPr>
     </a:lvl8pPr>
-    <a:lvl9pPr lvl="8" marR="0" rtl="0" algn="l">
+    <a:lvl9pPr marR="0" lvl="8" algn="l" rtl="0">
       <a:lnSpc>
         <a:spcPct val="100000"/>
       </a:lnSpc>
@@ -240,7 +241,7 @@
         <a:srgbClr val="000000"/>
       </a:buClr>
       <a:buFont typeface="Arial"/>
-      <a:defRPr b="0" i="0" sz="1400" u="none" cap="none" strike="noStrike">
+      <a:defRPr sz="1400" b="0" i="0" u="none" strike="noStrike" cap="none">
         <a:solidFill>
           <a:srgbClr val="000000"/>
         </a:solidFill>
@@ -253,7 +254,7 @@
   </p:defaultTextStyle>
   <p:extLst>
     <p:ext uri="{EFAFB233-063F-42B5-8137-9DF3F51BA10A}">
-      <p15:sldGuideLst>
+      <p15:sldGuideLst xmlns:p15="http://schemas.microsoft.com/office/powerpoint/2012/main">
         <p15:guide id="1" orient="horz" pos="1620">
           <p15:clr>
             <a:srgbClr val="A4A3A4"/>
@@ -270,12 +271,77 @@
 </p:presentation>
 </file>
 
+<file path=ppt/revisionInfo.xml><?xml version="1.0" encoding="utf-8"?>
+<p1510:revInfo xmlns:a="http://schemas.openxmlformats.org/drawingml/2006/main" xmlns:r="http://schemas.openxmlformats.org/officeDocument/2006/relationships" xmlns:p1510="http://schemas.microsoft.com/office/powerpoint/2015/10/main">
+  <p1510:revLst>
+    <p1510:client id="{A4DB8A81-F765-48D7-BA13-687640695E46}" v="3" dt="2018-12-12T07:53:04.532"/>
+  </p1510:revLst>
+</p1510:revInfo>
+</file>
+
+<file path=ppt/changesInfos/changesInfo1.xml><?xml version="1.0" encoding="utf-8"?>
+<pc:chgInfo xmlns:a="http://schemas.openxmlformats.org/drawingml/2006/main" xmlns:r="http://schemas.openxmlformats.org/officeDocument/2006/relationships" xmlns:ac="http://schemas.microsoft.com/office/drawing/2013/main/command" xmlns:pc="http://schemas.microsoft.com/office/powerpoint/2013/main/command">
+  <pc:docChgLst>
+    <pc:chgData name="Cooper Yungblut" userId="7f73948031400a0c" providerId="LiveId" clId="{A4DB8A81-F765-48D7-BA13-687640695E46}"/>
+    <pc:docChg chg="addSld modSld">
+      <pc:chgData name="Cooper Yungblut" userId="7f73948031400a0c" providerId="LiveId" clId="{A4DB8A81-F765-48D7-BA13-687640695E46}" dt="2018-12-12T07:53:09.942" v="30" actId="1076"/>
+      <pc:docMkLst>
+        <pc:docMk/>
+      </pc:docMkLst>
+      <pc:sldChg chg="modSp">
+        <pc:chgData name="Cooper Yungblut" userId="7f73948031400a0c" providerId="LiveId" clId="{A4DB8A81-F765-48D7-BA13-687640695E46}" dt="2018-12-12T07:52:52.043" v="15" actId="20577"/>
+        <pc:sldMkLst>
+          <pc:docMk/>
+          <pc:sldMk cId="0" sldId="257"/>
+        </pc:sldMkLst>
+        <pc:spChg chg="mod">
+          <ac:chgData name="Cooper Yungblut" userId="7f73948031400a0c" providerId="LiveId" clId="{A4DB8A81-F765-48D7-BA13-687640695E46}" dt="2018-12-12T07:52:52.043" v="15" actId="20577"/>
+          <ac:spMkLst>
+            <pc:docMk/>
+            <pc:sldMk cId="0" sldId="257"/>
+            <ac:spMk id="60" creationId="{00000000-0000-0000-0000-000000000000}"/>
+          </ac:spMkLst>
+        </pc:spChg>
+      </pc:sldChg>
+      <pc:sldChg chg="addSp modSp add">
+        <pc:chgData name="Cooper Yungblut" userId="7f73948031400a0c" providerId="LiveId" clId="{A4DB8A81-F765-48D7-BA13-687640695E46}" dt="2018-12-12T07:53:09.942" v="30" actId="1076"/>
+        <pc:sldMkLst>
+          <pc:docMk/>
+          <pc:sldMk cId="565209730" sldId="258"/>
+        </pc:sldMkLst>
+        <pc:spChg chg="mod">
+          <ac:chgData name="Cooper Yungblut" userId="7f73948031400a0c" providerId="LiveId" clId="{A4DB8A81-F765-48D7-BA13-687640695E46}" dt="2018-12-12T07:52:57.600" v="27" actId="20577"/>
+          <ac:spMkLst>
+            <pc:docMk/>
+            <pc:sldMk cId="565209730" sldId="258"/>
+            <ac:spMk id="2" creationId="{EBF1AEEF-E5FF-4073-B9FA-DA8EE0227D68}"/>
+          </ac:spMkLst>
+        </pc:spChg>
+        <pc:picChg chg="add mod">
+          <ac:chgData name="Cooper Yungblut" userId="7f73948031400a0c" providerId="LiveId" clId="{A4DB8A81-F765-48D7-BA13-687640695E46}" dt="2018-12-12T07:53:09.942" v="30" actId="1076"/>
+          <ac:picMkLst>
+            <pc:docMk/>
+            <pc:sldMk cId="565209730" sldId="258"/>
+            <ac:picMk id="4" creationId="{DC48233A-DB86-422D-BB70-75CABA20DF6A}"/>
+          </ac:picMkLst>
+        </pc:picChg>
+      </pc:sldChg>
+    </pc:docChg>
+  </pc:docChgLst>
+</pc:chgInfo>
+</file>
+
 <file path=ppt/notesMasters/notesMaster1.xml><?xml version="1.0" encoding="utf-8"?>
-<p:notesMaster xmlns:a="http://schemas.openxmlformats.org/drawingml/2006/main" xmlns:r="http://schemas.openxmlformats.org/officeDocument/2006/relationships" xmlns:mc="http://schemas.openxmlformats.org/markup-compatibility/2006" xmlns:mv="urn:schemas-microsoft-com:mac:vml" xmlns:p="http://schemas.openxmlformats.org/presentationml/2006/main" xmlns:c="http://schemas.openxmlformats.org/drawingml/2006/chart" xmlns:dgm="http://schemas.openxmlformats.org/drawingml/2006/diagram" xmlns:o="urn:schemas-microsoft-com:office:office" xmlns:v="urn:schemas-microsoft-com:vml" xmlns:pvml="urn:schemas-microsoft-com:office:powerpoint" xmlns:com="http://schemas.openxmlformats.org/drawingml/2006/compatibility" xmlns:p14="http://schemas.microsoft.com/office/powerpoint/2010/main" xmlns:p15="http://schemas.microsoft.com/office/powerpoint/2012/main">
+<p:notesMaster xmlns:a="http://schemas.openxmlformats.org/drawingml/2006/main" xmlns:r="http://schemas.openxmlformats.org/officeDocument/2006/relationships" xmlns:p="http://schemas.openxmlformats.org/presentationml/2006/main">
   <p:cSld>
+    <p:bg>
+      <p:bgRef idx="1001">
+        <a:schemeClr val="bg1"/>
+      </p:bgRef>
+    </p:bg>
     <p:spTree>
       <p:nvGrpSpPr>
-        <p:cNvPr id="2" name="Shape 2"/>
+        <p:cNvPr id="1" name="Shape 2"/>
         <p:cNvGrpSpPr/>
         <p:nvPr/>
       </p:nvGrpSpPr>
@@ -290,9 +356,11 @@
       <p:sp>
         <p:nvSpPr>
           <p:cNvPr id="3" name="Google Shape;3;n"/>
-          <p:cNvSpPr/>
+          <p:cNvSpPr>
+            <a:spLocks noGrp="1" noRot="1" noChangeAspect="1"/>
+          </p:cNvSpPr>
           <p:nvPr>
-            <p:ph idx="2" type="sldImg"/>
+            <p:ph type="sldImg" idx="2"/>
           </p:nvPr>
         </p:nvSpPr>
         <p:spPr>
@@ -301,9 +369,13 @@
             <a:ext cx="6096075" cy="3429000"/>
           </a:xfrm>
           <a:custGeom>
-            <a:rect b="b" l="l" r="r" t="t"/>
+            <a:avLst/>
+            <a:gdLst/>
+            <a:ahLst/>
+            <a:cxnLst/>
+            <a:rect l="l" t="t" r="r" b="b"/>
             <a:pathLst>
-              <a:path extrusionOk="0" h="120000" w="120000">
+              <a:path w="120000" h="120000" extrusionOk="0">
                 <a:moveTo>
                   <a:pt x="0" y="0"/>
                 </a:moveTo>
@@ -321,23 +393,25 @@
             </a:pathLst>
           </a:custGeom>
           <a:noFill/>
-          <a:ln cap="flat" cmpd="sng" w="9525">
+          <a:ln w="9525" cap="flat" cmpd="sng">
             <a:solidFill>
               <a:srgbClr val="000000"/>
             </a:solidFill>
             <a:prstDash val="solid"/>
             <a:round/>
-            <a:headEnd len="sm" w="sm" type="none"/>
-            <a:tailEnd len="sm" w="sm" type="none"/>
+            <a:headEnd type="none" w="sm" len="sm"/>
+            <a:tailEnd type="none" w="sm" len="sm"/>
           </a:ln>
         </p:spPr>
       </p:sp>
       <p:sp>
         <p:nvSpPr>
           <p:cNvPr id="4" name="Google Shape;4;n"/>
-          <p:cNvSpPr txBox="1"/>
+          <p:cNvSpPr txBox="1">
+            <a:spLocks noGrp="1"/>
+          </p:cNvSpPr>
           <p:nvPr>
-            <p:ph idx="1" type="body"/>
+            <p:ph type="body" idx="1"/>
           </p:nvPr>
         </p:nvSpPr>
         <p:spPr>
@@ -354,9 +428,9 @@
           </a:ln>
         </p:spPr>
         <p:txBody>
-          <a:bodyPr anchorCtr="0" anchor="t" bIns="91425" lIns="91425" spcFirstLastPara="1" rIns="91425" wrap="square" tIns="91425"/>
+          <a:bodyPr spcFirstLastPara="1" wrap="square" lIns="91425" tIns="91425" rIns="91425" bIns="91425" anchor="t" anchorCtr="0"/>
           <a:lstStyle>
-            <a:lvl1pPr indent="-298450" lvl="0" marL="457200">
+            <a:lvl1pPr marL="457200" lvl="0" indent="-298450">
               <a:spcBef>
                 <a:spcPts val="0"/>
               </a:spcBef>
@@ -367,7 +441,7 @@
               <a:buChar char="●"/>
               <a:defRPr sz="1100"/>
             </a:lvl1pPr>
-            <a:lvl2pPr indent="-298450" lvl="1" marL="914400">
+            <a:lvl2pPr marL="914400" lvl="1" indent="-298450">
               <a:spcBef>
                 <a:spcPts val="0"/>
               </a:spcBef>
@@ -378,7 +452,7 @@
               <a:buChar char="○"/>
               <a:defRPr sz="1100"/>
             </a:lvl2pPr>
-            <a:lvl3pPr indent="-298450" lvl="2" marL="1371600">
+            <a:lvl3pPr marL="1371600" lvl="2" indent="-298450">
               <a:spcBef>
                 <a:spcPts val="0"/>
               </a:spcBef>
@@ -389,7 +463,7 @@
               <a:buChar char="■"/>
               <a:defRPr sz="1100"/>
             </a:lvl3pPr>
-            <a:lvl4pPr indent="-298450" lvl="3" marL="1828800">
+            <a:lvl4pPr marL="1828800" lvl="3" indent="-298450">
               <a:spcBef>
                 <a:spcPts val="0"/>
               </a:spcBef>
@@ -400,7 +474,7 @@
               <a:buChar char="●"/>
               <a:defRPr sz="1100"/>
             </a:lvl4pPr>
-            <a:lvl5pPr indent="-298450" lvl="4" marL="2286000">
+            <a:lvl5pPr marL="2286000" lvl="4" indent="-298450">
               <a:spcBef>
                 <a:spcPts val="0"/>
               </a:spcBef>
@@ -411,7 +485,7 @@
               <a:buChar char="○"/>
               <a:defRPr sz="1100"/>
             </a:lvl5pPr>
-            <a:lvl6pPr indent="-298450" lvl="5" marL="2743200">
+            <a:lvl6pPr marL="2743200" lvl="5" indent="-298450">
               <a:spcBef>
                 <a:spcPts val="0"/>
               </a:spcBef>
@@ -422,7 +496,7 @@
               <a:buChar char="■"/>
               <a:defRPr sz="1100"/>
             </a:lvl6pPr>
-            <a:lvl7pPr indent="-298450" lvl="6" marL="3200400">
+            <a:lvl7pPr marL="3200400" lvl="6" indent="-298450">
               <a:spcBef>
                 <a:spcPts val="0"/>
               </a:spcBef>
@@ -433,7 +507,7 @@
               <a:buChar char="●"/>
               <a:defRPr sz="1100"/>
             </a:lvl7pPr>
-            <a:lvl8pPr indent="-298450" lvl="7" marL="3657600">
+            <a:lvl8pPr marL="3657600" lvl="7" indent="-298450">
               <a:spcBef>
                 <a:spcPts val="0"/>
               </a:spcBef>
@@ -444,7 +518,7 @@
               <a:buChar char="○"/>
               <a:defRPr sz="1100"/>
             </a:lvl8pPr>
-            <a:lvl9pPr indent="-298450" lvl="8" marL="4114800">
+            <a:lvl9pPr marL="4114800" lvl="8" indent="-298450">
               <a:spcBef>
                 <a:spcPts val="0"/>
               </a:spcBef>
@@ -456,14 +530,16 @@
               <a:defRPr sz="1100"/>
             </a:lvl9pPr>
           </a:lstStyle>
-          <a:p/>
+          <a:p>
+            <a:endParaRPr/>
+          </a:p>
         </p:txBody>
       </p:sp>
     </p:spTree>
   </p:cSld>
-  <p:clrMap accent1="accent1" accent2="accent2" accent3="accent3" accent4="accent4" accent5="accent5" accent6="accent6" bg1="lt1" bg2="dk2" tx1="dk1" tx2="lt2" folHlink="folHlink" hlink="hlink"/>
+  <p:clrMap bg1="lt1" tx1="dk1" bg2="dk2" tx2="lt2" accent1="accent1" accent2="accent2" accent3="accent3" accent4="accent4" accent5="accent5" accent6="accent6" hlink="hlink" folHlink="folHlink"/>
   <p:notesStyle>
-    <a:defPPr lvl="0" marR="0" rtl="0" algn="l">
+    <a:defPPr marR="0" lvl="0" algn="l" rtl="0">
       <a:lnSpc>
         <a:spcPct val="100000"/>
       </a:lnSpc>
@@ -474,7 +550,7 @@
         <a:spcPts val="0"/>
       </a:spcAft>
     </a:defPPr>
-    <a:lvl1pPr lvl="0" marR="0" rtl="0" algn="l">
+    <a:lvl1pPr marR="0" lvl="0" algn="l" rtl="0">
       <a:lnSpc>
         <a:spcPct val="100000"/>
       </a:lnSpc>
@@ -488,7 +564,7 @@
         <a:srgbClr val="000000"/>
       </a:buClr>
       <a:buFont typeface="Arial"/>
-      <a:defRPr b="0" i="0" sz="1400" u="none" cap="none" strike="noStrike">
+      <a:defRPr sz="1400" b="0" i="0" u="none" strike="noStrike" cap="none">
         <a:solidFill>
           <a:srgbClr val="000000"/>
         </a:solidFill>
@@ -498,7 +574,7 @@
         <a:sym typeface="Arial"/>
       </a:defRPr>
     </a:lvl1pPr>
-    <a:lvl2pPr lvl="1" marR="0" rtl="0" algn="l">
+    <a:lvl2pPr marR="0" lvl="1" algn="l" rtl="0">
       <a:lnSpc>
         <a:spcPct val="100000"/>
       </a:lnSpc>
@@ -512,7 +588,7 @@
         <a:srgbClr val="000000"/>
       </a:buClr>
       <a:buFont typeface="Arial"/>
-      <a:defRPr b="0" i="0" sz="1400" u="none" cap="none" strike="noStrike">
+      <a:defRPr sz="1400" b="0" i="0" u="none" strike="noStrike" cap="none">
         <a:solidFill>
           <a:srgbClr val="000000"/>
         </a:solidFill>
@@ -522,7 +598,7 @@
         <a:sym typeface="Arial"/>
       </a:defRPr>
     </a:lvl2pPr>
-    <a:lvl3pPr lvl="2" marR="0" rtl="0" algn="l">
+    <a:lvl3pPr marR="0" lvl="2" algn="l" rtl="0">
       <a:lnSpc>
         <a:spcPct val="100000"/>
       </a:lnSpc>
@@ -536,7 +612,7 @@
         <a:srgbClr val="000000"/>
       </a:buClr>
       <a:buFont typeface="Arial"/>
-      <a:defRPr b="0" i="0" sz="1400" u="none" cap="none" strike="noStrike">
+      <a:defRPr sz="1400" b="0" i="0" u="none" strike="noStrike" cap="none">
         <a:solidFill>
           <a:srgbClr val="000000"/>
         </a:solidFill>
@@ -546,7 +622,7 @@
         <a:sym typeface="Arial"/>
       </a:defRPr>
     </a:lvl3pPr>
-    <a:lvl4pPr lvl="3" marR="0" rtl="0" algn="l">
+    <a:lvl4pPr marR="0" lvl="3" algn="l" rtl="0">
       <a:lnSpc>
         <a:spcPct val="100000"/>
       </a:lnSpc>
@@ -560,7 +636,7 @@
         <a:srgbClr val="000000"/>
       </a:buClr>
       <a:buFont typeface="Arial"/>
-      <a:defRPr b="0" i="0" sz="1400" u="none" cap="none" strike="noStrike">
+      <a:defRPr sz="1400" b="0" i="0" u="none" strike="noStrike" cap="none">
         <a:solidFill>
           <a:srgbClr val="000000"/>
         </a:solidFill>
@@ -570,7 +646,7 @@
         <a:sym typeface="Arial"/>
       </a:defRPr>
     </a:lvl4pPr>
-    <a:lvl5pPr lvl="4" marR="0" rtl="0" algn="l">
+    <a:lvl5pPr marR="0" lvl="4" algn="l" rtl="0">
       <a:lnSpc>
         <a:spcPct val="100000"/>
       </a:lnSpc>
@@ -584,7 +660,7 @@
         <a:srgbClr val="000000"/>
       </a:buClr>
       <a:buFont typeface="Arial"/>
-      <a:defRPr b="0" i="0" sz="1400" u="none" cap="none" strike="noStrike">
+      <a:defRPr sz="1400" b="0" i="0" u="none" strike="noStrike" cap="none">
         <a:solidFill>
           <a:srgbClr val="000000"/>
         </a:solidFill>
@@ -594,7 +670,7 @@
         <a:sym typeface="Arial"/>
       </a:defRPr>
     </a:lvl5pPr>
-    <a:lvl6pPr lvl="5" marR="0" rtl="0" algn="l">
+    <a:lvl6pPr marR="0" lvl="5" algn="l" rtl="0">
       <a:lnSpc>
         <a:spcPct val="100000"/>
       </a:lnSpc>
@@ -608,7 +684,7 @@
         <a:srgbClr val="000000"/>
       </a:buClr>
       <a:buFont typeface="Arial"/>
-      <a:defRPr b="0" i="0" sz="1400" u="none" cap="none" strike="noStrike">
+      <a:defRPr sz="1400" b="0" i="0" u="none" strike="noStrike" cap="none">
         <a:solidFill>
           <a:srgbClr val="000000"/>
         </a:solidFill>
@@ -618,7 +694,7 @@
         <a:sym typeface="Arial"/>
       </a:defRPr>
     </a:lvl6pPr>
-    <a:lvl7pPr lvl="6" marR="0" rtl="0" algn="l">
+    <a:lvl7pPr marR="0" lvl="6" algn="l" rtl="0">
       <a:lnSpc>
         <a:spcPct val="100000"/>
       </a:lnSpc>
@@ -632,7 +708,7 @@
         <a:srgbClr val="000000"/>
       </a:buClr>
       <a:buFont typeface="Arial"/>
-      <a:defRPr b="0" i="0" sz="1400" u="none" cap="none" strike="noStrike">
+      <a:defRPr sz="1400" b="0" i="0" u="none" strike="noStrike" cap="none">
         <a:solidFill>
           <a:srgbClr val="000000"/>
         </a:solidFill>
@@ -642,7 +718,7 @@
         <a:sym typeface="Arial"/>
       </a:defRPr>
     </a:lvl7pPr>
-    <a:lvl8pPr lvl="7" marR="0" rtl="0" algn="l">
+    <a:lvl8pPr marR="0" lvl="7" algn="l" rtl="0">
       <a:lnSpc>
         <a:spcPct val="100000"/>
       </a:lnSpc>
@@ -656,7 +732,7 @@
         <a:srgbClr val="000000"/>
       </a:buClr>
       <a:buFont typeface="Arial"/>
-      <a:defRPr b="0" i="0" sz="1400" u="none" cap="none" strike="noStrike">
+      <a:defRPr sz="1400" b="0" i="0" u="none" strike="noStrike" cap="none">
         <a:solidFill>
           <a:srgbClr val="000000"/>
         </a:solidFill>
@@ -666,7 +742,7 @@
         <a:sym typeface="Arial"/>
       </a:defRPr>
     </a:lvl8pPr>
-    <a:lvl9pPr lvl="8" marR="0" rtl="0" algn="l">
+    <a:lvl9pPr marR="0" lvl="8" algn="l" rtl="0">
       <a:lnSpc>
         <a:spcPct val="100000"/>
       </a:lnSpc>
@@ -680,7 +756,7 @@
         <a:srgbClr val="000000"/>
       </a:buClr>
       <a:buFont typeface="Arial"/>
-      <a:defRPr b="0" i="0" sz="1400" u="none" cap="none" strike="noStrike">
+      <a:defRPr sz="1400" b="0" i="0" u="none" strike="noStrike" cap="none">
         <a:solidFill>
           <a:srgbClr val="000000"/>
         </a:solidFill>
@@ -695,11 +771,11 @@
 </file>
 
 <file path=ppt/notesSlides/notesSlide1.xml><?xml version="1.0" encoding="utf-8"?>
-<p:notes xmlns:a="http://schemas.openxmlformats.org/drawingml/2006/main" xmlns:r="http://schemas.openxmlformats.org/officeDocument/2006/relationships" xmlns:mc="http://schemas.openxmlformats.org/markup-compatibility/2006" xmlns:mv="urn:schemas-microsoft-com:mac:vml" xmlns:p="http://schemas.openxmlformats.org/presentationml/2006/main" xmlns:c="http://schemas.openxmlformats.org/drawingml/2006/chart" xmlns:dgm="http://schemas.openxmlformats.org/drawingml/2006/diagram" xmlns:o="urn:schemas-microsoft-com:office:office" xmlns:v="urn:schemas-microsoft-com:vml" xmlns:pvml="urn:schemas-microsoft-com:office:powerpoint" xmlns:com="http://schemas.openxmlformats.org/drawingml/2006/compatibility" xmlns:p14="http://schemas.microsoft.com/office/powerpoint/2010/main" xmlns:p15="http://schemas.microsoft.com/office/powerpoint/2012/main" showMasterPhAnim="0" showMasterSp="0">
+<p:notes xmlns:a="http://schemas.openxmlformats.org/drawingml/2006/main" xmlns:r="http://schemas.openxmlformats.org/officeDocument/2006/relationships" xmlns:p="http://schemas.openxmlformats.org/presentationml/2006/main" showMasterSp="0" showMasterPhAnim="0">
   <p:cSld>
     <p:spTree>
       <p:nvGrpSpPr>
-        <p:cNvPr id="50" name="Shape 50"/>
+        <p:cNvPr id="1" name="Shape 50"/>
         <p:cNvGrpSpPr/>
         <p:nvPr/>
       </p:nvGrpSpPr>
@@ -714,9 +790,11 @@
       <p:sp>
         <p:nvSpPr>
           <p:cNvPr id="51" name="Google Shape;51;p:notes"/>
-          <p:cNvSpPr/>
+          <p:cNvSpPr>
+            <a:spLocks noGrp="1" noRot="1" noChangeAspect="1"/>
+          </p:cNvSpPr>
           <p:nvPr>
-            <p:ph idx="2" type="sldImg"/>
+            <p:ph type="sldImg" idx="2"/>
           </p:nvPr>
         </p:nvSpPr>
         <p:spPr>
@@ -725,9 +803,13 @@
             <a:ext cx="6096075" cy="3429000"/>
           </a:xfrm>
           <a:custGeom>
-            <a:rect b="b" l="l" r="r" t="t"/>
+            <a:avLst/>
+            <a:gdLst/>
+            <a:ahLst/>
+            <a:cxnLst/>
+            <a:rect l="l" t="t" r="r" b="b"/>
             <a:pathLst>
-              <a:path extrusionOk="0" h="120000" w="120000">
+              <a:path w="120000" h="120000" extrusionOk="0">
                 <a:moveTo>
                   <a:pt x="0" y="0"/>
                 </a:moveTo>
@@ -749,9 +831,11 @@
       <p:sp>
         <p:nvSpPr>
           <p:cNvPr id="52" name="Google Shape;52;p:notes"/>
-          <p:cNvSpPr txBox="1"/>
+          <p:cNvSpPr txBox="1">
+            <a:spLocks noGrp="1"/>
+          </p:cNvSpPr>
           <p:nvPr>
-            <p:ph idx="1" type="body"/>
+            <p:ph type="body" idx="1"/>
           </p:nvPr>
         </p:nvSpPr>
         <p:spPr>
@@ -764,12 +848,12 @@
           </a:prstGeom>
         </p:spPr>
         <p:txBody>
-          <a:bodyPr anchorCtr="0" anchor="t" bIns="91425" lIns="91425" spcFirstLastPara="1" rIns="91425" wrap="square" tIns="91425">
+          <a:bodyPr spcFirstLastPara="1" wrap="square" lIns="91425" tIns="91425" rIns="91425" bIns="91425" anchor="t" anchorCtr="0">
             <a:noAutofit/>
           </a:bodyPr>
           <a:lstStyle/>
           <a:p>
-            <a:pPr indent="0" lvl="0" marL="0" rtl="0" algn="l">
+            <a:pPr marL="0" lvl="0" indent="0" algn="l" rtl="0">
               <a:spcBef>
                 <a:spcPts val="0"/>
               </a:spcBef>
@@ -778,9 +862,6 @@
               </a:spcAft>
               <a:buNone/>
             </a:pPr>
-            <a:r>
-              <a:t/>
-            </a:r>
             <a:endParaRPr/>
           </a:p>
         </p:txBody>
@@ -794,11 +875,11 @@
 </file>
 
 <file path=ppt/notesSlides/notesSlide2.xml><?xml version="1.0" encoding="utf-8"?>
-<p:notes xmlns:a="http://schemas.openxmlformats.org/drawingml/2006/main" xmlns:r="http://schemas.openxmlformats.org/officeDocument/2006/relationships" xmlns:mc="http://schemas.openxmlformats.org/markup-compatibility/2006" xmlns:mv="urn:schemas-microsoft-com:mac:vml" xmlns:p="http://schemas.openxmlformats.org/presentationml/2006/main" xmlns:c="http://schemas.openxmlformats.org/drawingml/2006/chart" xmlns:dgm="http://schemas.openxmlformats.org/drawingml/2006/diagram" xmlns:o="urn:schemas-microsoft-com:office:office" xmlns:v="urn:schemas-microsoft-com:vml" xmlns:pvml="urn:schemas-microsoft-com:office:powerpoint" xmlns:com="http://schemas.openxmlformats.org/drawingml/2006/compatibility" xmlns:p14="http://schemas.microsoft.com/office/powerpoint/2010/main" xmlns:p15="http://schemas.microsoft.com/office/powerpoint/2012/main" showMasterPhAnim="0" showMasterSp="0">
+<p:notes xmlns:a="http://schemas.openxmlformats.org/drawingml/2006/main" xmlns:r="http://schemas.openxmlformats.org/officeDocument/2006/relationships" xmlns:p="http://schemas.openxmlformats.org/presentationml/2006/main" showMasterSp="0" showMasterPhAnim="0">
   <p:cSld>
     <p:spTree>
       <p:nvGrpSpPr>
-        <p:cNvPr id="56" name="Shape 56"/>
+        <p:cNvPr id="1" name="Shape 56"/>
         <p:cNvGrpSpPr/>
         <p:nvPr/>
       </p:nvGrpSpPr>
@@ -813,20 +894,26 @@
       <p:sp>
         <p:nvSpPr>
           <p:cNvPr id="57" name="Google Shape;57;g42dcfe7f34_0_0:notes"/>
-          <p:cNvSpPr/>
+          <p:cNvSpPr>
+            <a:spLocks noGrp="1" noRot="1" noChangeAspect="1"/>
+          </p:cNvSpPr>
           <p:nvPr>
-            <p:ph idx="2" type="sldImg"/>
+            <p:ph type="sldImg" idx="2"/>
           </p:nvPr>
         </p:nvSpPr>
         <p:spPr>
           <a:xfrm>
-            <a:off x="381300" y="685800"/>
+            <a:off x="381000" y="685800"/>
             <a:ext cx="6096000" cy="3429000"/>
           </a:xfrm>
           <a:custGeom>
-            <a:rect b="b" l="l" r="r" t="t"/>
+            <a:avLst/>
+            <a:gdLst/>
+            <a:ahLst/>
+            <a:cxnLst/>
+            <a:rect l="l" t="t" r="r" b="b"/>
             <a:pathLst>
-              <a:path extrusionOk="0" h="120000" w="120000">
+              <a:path w="120000" h="120000" extrusionOk="0">
                 <a:moveTo>
                   <a:pt x="0" y="0"/>
                 </a:moveTo>
@@ -848,9 +935,11 @@
       <p:sp>
         <p:nvSpPr>
           <p:cNvPr id="58" name="Google Shape;58;g42dcfe7f34_0_0:notes"/>
-          <p:cNvSpPr txBox="1"/>
+          <p:cNvSpPr txBox="1">
+            <a:spLocks noGrp="1"/>
+          </p:cNvSpPr>
           <p:nvPr>
-            <p:ph idx="1" type="body"/>
+            <p:ph type="body" idx="1"/>
           </p:nvPr>
         </p:nvSpPr>
         <p:spPr>
@@ -863,12 +952,12 @@
           </a:prstGeom>
         </p:spPr>
         <p:txBody>
-          <a:bodyPr anchorCtr="0" anchor="t" bIns="91425" lIns="91425" spcFirstLastPara="1" rIns="91425" wrap="square" tIns="91425">
+          <a:bodyPr spcFirstLastPara="1" wrap="square" lIns="91425" tIns="91425" rIns="91425" bIns="91425" anchor="t" anchorCtr="0">
             <a:noAutofit/>
           </a:bodyPr>
           <a:lstStyle/>
           <a:p>
-            <a:pPr indent="0" lvl="0" marL="0" rtl="0" algn="l">
+            <a:pPr marL="0" lvl="0" indent="0" algn="l" rtl="0">
               <a:spcBef>
                 <a:spcPts val="0"/>
               </a:spcBef>
@@ -877,9 +966,6 @@
               </a:spcAft>
               <a:buNone/>
             </a:pPr>
-            <a:r>
-              <a:t/>
-            </a:r>
             <a:endParaRPr/>
           </a:p>
         </p:txBody>
@@ -893,11 +979,11 @@
 </file>
 
 <file path=ppt/slideLayouts/slideLayout1.xml><?xml version="1.0" encoding="utf-8"?>
-<p:sldLayout xmlns:a="http://schemas.openxmlformats.org/drawingml/2006/main" xmlns:r="http://schemas.openxmlformats.org/officeDocument/2006/relationships" xmlns:mc="http://schemas.openxmlformats.org/markup-compatibility/2006" xmlns:mv="urn:schemas-microsoft-com:mac:vml" xmlns:p="http://schemas.openxmlformats.org/presentationml/2006/main" xmlns:c="http://schemas.openxmlformats.org/drawingml/2006/chart" xmlns:dgm="http://schemas.openxmlformats.org/drawingml/2006/diagram" xmlns:o="urn:schemas-microsoft-com:office:office" xmlns:v="urn:schemas-microsoft-com:vml" xmlns:pvml="urn:schemas-microsoft-com:office:powerpoint" xmlns:com="http://schemas.openxmlformats.org/drawingml/2006/compatibility" xmlns:p14="http://schemas.microsoft.com/office/powerpoint/2010/main" xmlns:p15="http://schemas.microsoft.com/office/powerpoint/2012/main" matchingName="Title slide" type="title">
+<p:sldLayout xmlns:a="http://schemas.openxmlformats.org/drawingml/2006/main" xmlns:r="http://schemas.openxmlformats.org/officeDocument/2006/relationships" xmlns:p="http://schemas.openxmlformats.org/presentationml/2006/main" matchingName="Title slide" type="title">
   <p:cSld name="TITLE">
     <p:spTree>
       <p:nvGrpSpPr>
-        <p:cNvPr id="9" name="Shape 9"/>
+        <p:cNvPr id="1" name="Shape 9"/>
         <p:cNvGrpSpPr/>
         <p:nvPr/>
       </p:nvGrpSpPr>
@@ -912,7 +998,9 @@
       <p:sp>
         <p:nvSpPr>
           <p:cNvPr id="10" name="Google Shape;10;p2"/>
-          <p:cNvSpPr txBox="1"/>
+          <p:cNvSpPr txBox="1">
+            <a:spLocks noGrp="1"/>
+          </p:cNvSpPr>
           <p:nvPr>
             <p:ph type="ctrTitle"/>
           </p:nvPr>
@@ -927,7 +1015,7 @@
           </a:prstGeom>
         </p:spPr>
         <p:txBody>
-          <a:bodyPr anchorCtr="0" anchor="b" bIns="91425" lIns="91425" spcFirstLastPara="1" rIns="91425" wrap="square" tIns="91425"/>
+          <a:bodyPr spcFirstLastPara="1" wrap="square" lIns="91425" tIns="91425" rIns="91425" bIns="91425" anchor="b" anchorCtr="0"/>
           <a:lstStyle>
             <a:lvl1pPr lvl="0" algn="ctr">
               <a:spcBef>
@@ -1029,15 +1117,19 @@
               <a:defRPr sz="5200"/>
             </a:lvl9pPr>
           </a:lstStyle>
-          <a:p/>
+          <a:p>
+            <a:endParaRPr/>
+          </a:p>
         </p:txBody>
       </p:sp>
       <p:sp>
         <p:nvSpPr>
           <p:cNvPr id="11" name="Google Shape;11;p2"/>
-          <p:cNvSpPr txBox="1"/>
+          <p:cNvSpPr txBox="1">
+            <a:spLocks noGrp="1"/>
+          </p:cNvSpPr>
           <p:nvPr>
-            <p:ph idx="1" type="subTitle"/>
+            <p:ph type="subTitle" idx="1"/>
           </p:nvPr>
         </p:nvSpPr>
         <p:spPr>
@@ -1050,7 +1142,7 @@
           </a:prstGeom>
         </p:spPr>
         <p:txBody>
-          <a:bodyPr anchorCtr="0" anchor="t" bIns="91425" lIns="91425" spcFirstLastPara="1" rIns="91425" wrap="square" tIns="91425"/>
+          <a:bodyPr spcFirstLastPara="1" wrap="square" lIns="91425" tIns="91425" rIns="91425" bIns="91425" anchor="t" anchorCtr="0"/>
           <a:lstStyle>
             <a:lvl1pPr lvl="0" algn="ctr">
               <a:lnSpc>
@@ -1179,15 +1271,19 @@
               <a:defRPr sz="2800"/>
             </a:lvl9pPr>
           </a:lstStyle>
-          <a:p/>
+          <a:p>
+            <a:endParaRPr/>
+          </a:p>
         </p:txBody>
       </p:sp>
       <p:sp>
         <p:nvSpPr>
           <p:cNvPr id="12" name="Google Shape;12;p2"/>
-          <p:cNvSpPr txBox="1"/>
+          <p:cNvSpPr txBox="1">
+            <a:spLocks noGrp="1"/>
+          </p:cNvSpPr>
           <p:nvPr>
-            <p:ph idx="12" type="sldNum"/>
+            <p:ph type="sldNum" idx="12"/>
           </p:nvPr>
         </p:nvSpPr>
         <p:spPr>
@@ -1200,7 +1296,7 @@
           </a:prstGeom>
         </p:spPr>
         <p:txBody>
-          <a:bodyPr anchorCtr="0" anchor="ctr" bIns="91425" lIns="91425" spcFirstLastPara="1" rIns="91425" wrap="square" tIns="91425">
+          <a:bodyPr spcFirstLastPara="1" wrap="square" lIns="91425" tIns="91425" rIns="91425" bIns="91425" anchor="ctr" anchorCtr="0">
             <a:noAutofit/>
           </a:bodyPr>
           <a:lstStyle>
@@ -1242,7 +1338,7 @@
             </a:lvl9pPr>
           </a:lstStyle>
           <a:p>
-            <a:pPr indent="0" lvl="0" marL="0" rtl="0" algn="r">
+            <a:pPr marL="0" lvl="0" indent="0" algn="r" rtl="0">
               <a:spcBef>
                 <a:spcPts val="0"/>
               </a:spcBef>
@@ -1268,11 +1364,11 @@
 </file>
 
 <file path=ppt/slideLayouts/slideLayout10.xml><?xml version="1.0" encoding="utf-8"?>
-<p:sldLayout xmlns:a="http://schemas.openxmlformats.org/drawingml/2006/main" xmlns:r="http://schemas.openxmlformats.org/officeDocument/2006/relationships" xmlns:mc="http://schemas.openxmlformats.org/markup-compatibility/2006" xmlns:mv="urn:schemas-microsoft-com:mac:vml" xmlns:p="http://schemas.openxmlformats.org/presentationml/2006/main" xmlns:c="http://schemas.openxmlformats.org/drawingml/2006/chart" xmlns:dgm="http://schemas.openxmlformats.org/drawingml/2006/diagram" xmlns:o="urn:schemas-microsoft-com:office:office" xmlns:v="urn:schemas-microsoft-com:vml" xmlns:pvml="urn:schemas-microsoft-com:office:powerpoint" xmlns:com="http://schemas.openxmlformats.org/drawingml/2006/compatibility" xmlns:p14="http://schemas.microsoft.com/office/powerpoint/2010/main" xmlns:p15="http://schemas.microsoft.com/office/powerpoint/2012/main" matchingName="Big number">
+<p:sldLayout xmlns:a="http://schemas.openxmlformats.org/drawingml/2006/main" xmlns:r="http://schemas.openxmlformats.org/officeDocument/2006/relationships" xmlns:p="http://schemas.openxmlformats.org/presentationml/2006/main" matchingName="Big number">
   <p:cSld name="BIG_NUMBER">
     <p:spTree>
       <p:nvGrpSpPr>
-        <p:cNvPr id="44" name="Shape 44"/>
+        <p:cNvPr id="1" name="Shape 44"/>
         <p:cNvGrpSpPr/>
         <p:nvPr/>
       </p:nvGrpSpPr>
@@ -1287,9 +1383,11 @@
       <p:sp>
         <p:nvSpPr>
           <p:cNvPr id="45" name="Google Shape;45;p11"/>
-          <p:cNvSpPr txBox="1"/>
+          <p:cNvSpPr txBox="1">
+            <a:spLocks noGrp="1"/>
+          </p:cNvSpPr>
           <p:nvPr>
-            <p:ph hasCustomPrompt="1" type="title"/>
+            <p:ph type="title" hasCustomPrompt="1"/>
           </p:nvPr>
         </p:nvSpPr>
         <p:spPr>
@@ -1302,7 +1400,7 @@
           </a:prstGeom>
         </p:spPr>
         <p:txBody>
-          <a:bodyPr anchorCtr="0" anchor="b" bIns="91425" lIns="91425" spcFirstLastPara="1" rIns="91425" wrap="square" tIns="91425"/>
+          <a:bodyPr spcFirstLastPara="1" wrap="square" lIns="91425" tIns="91425" rIns="91425" bIns="91425" anchor="b" anchorCtr="0"/>
           <a:lstStyle>
             <a:lvl1pPr lvl="0" algn="ctr">
               <a:spcBef>
@@ -1414,9 +1512,11 @@
       <p:sp>
         <p:nvSpPr>
           <p:cNvPr id="46" name="Google Shape;46;p11"/>
-          <p:cNvSpPr txBox="1"/>
+          <p:cNvSpPr txBox="1">
+            <a:spLocks noGrp="1"/>
+          </p:cNvSpPr>
           <p:nvPr>
-            <p:ph idx="1" type="body"/>
+            <p:ph type="body" idx="1"/>
           </p:nvPr>
         </p:nvSpPr>
         <p:spPr>
@@ -1429,9 +1529,9 @@
           </a:prstGeom>
         </p:spPr>
         <p:txBody>
-          <a:bodyPr anchorCtr="0" anchor="t" bIns="91425" lIns="91425" spcFirstLastPara="1" rIns="91425" wrap="square" tIns="91425"/>
+          <a:bodyPr spcFirstLastPara="1" wrap="square" lIns="91425" tIns="91425" rIns="91425" bIns="91425" anchor="t" anchorCtr="0"/>
           <a:lstStyle>
-            <a:lvl1pPr indent="-342900" lvl="0" marL="457200" algn="ctr">
+            <a:lvl1pPr marL="457200" lvl="0" indent="-342900" algn="ctr">
               <a:spcBef>
                 <a:spcPts val="0"/>
               </a:spcBef>
@@ -1442,7 +1542,7 @@
               <a:buChar char="●"/>
               <a:defRPr/>
             </a:lvl1pPr>
-            <a:lvl2pPr indent="-317500" lvl="1" marL="914400" algn="ctr">
+            <a:lvl2pPr marL="914400" lvl="1" indent="-317500" algn="ctr">
               <a:spcBef>
                 <a:spcPts val="1600"/>
               </a:spcBef>
@@ -1453,7 +1553,7 @@
               <a:buChar char="○"/>
               <a:defRPr/>
             </a:lvl2pPr>
-            <a:lvl3pPr indent="-317500" lvl="2" marL="1371600" algn="ctr">
+            <a:lvl3pPr marL="1371600" lvl="2" indent="-317500" algn="ctr">
               <a:spcBef>
                 <a:spcPts val="1600"/>
               </a:spcBef>
@@ -1464,7 +1564,7 @@
               <a:buChar char="■"/>
               <a:defRPr/>
             </a:lvl3pPr>
-            <a:lvl4pPr indent="-317500" lvl="3" marL="1828800" algn="ctr">
+            <a:lvl4pPr marL="1828800" lvl="3" indent="-317500" algn="ctr">
               <a:spcBef>
                 <a:spcPts val="1600"/>
               </a:spcBef>
@@ -1475,7 +1575,7 @@
               <a:buChar char="●"/>
               <a:defRPr/>
             </a:lvl4pPr>
-            <a:lvl5pPr indent="-317500" lvl="4" marL="2286000" algn="ctr">
+            <a:lvl5pPr marL="2286000" lvl="4" indent="-317500" algn="ctr">
               <a:spcBef>
                 <a:spcPts val="1600"/>
               </a:spcBef>
@@ -1486,7 +1586,7 @@
               <a:buChar char="○"/>
               <a:defRPr/>
             </a:lvl5pPr>
-            <a:lvl6pPr indent="-317500" lvl="5" marL="2743200" algn="ctr">
+            <a:lvl6pPr marL="2743200" lvl="5" indent="-317500" algn="ctr">
               <a:spcBef>
                 <a:spcPts val="1600"/>
               </a:spcBef>
@@ -1497,7 +1597,7 @@
               <a:buChar char="■"/>
               <a:defRPr/>
             </a:lvl6pPr>
-            <a:lvl7pPr indent="-317500" lvl="6" marL="3200400" algn="ctr">
+            <a:lvl7pPr marL="3200400" lvl="6" indent="-317500" algn="ctr">
               <a:spcBef>
                 <a:spcPts val="1600"/>
               </a:spcBef>
@@ -1508,7 +1608,7 @@
               <a:buChar char="●"/>
               <a:defRPr/>
             </a:lvl7pPr>
-            <a:lvl8pPr indent="-317500" lvl="7" marL="3657600" algn="ctr">
+            <a:lvl8pPr marL="3657600" lvl="7" indent="-317500" algn="ctr">
               <a:spcBef>
                 <a:spcPts val="1600"/>
               </a:spcBef>
@@ -1519,7 +1619,7 @@
               <a:buChar char="○"/>
               <a:defRPr/>
             </a:lvl8pPr>
-            <a:lvl9pPr indent="-317500" lvl="8" marL="4114800" algn="ctr">
+            <a:lvl9pPr marL="4114800" lvl="8" indent="-317500" algn="ctr">
               <a:spcBef>
                 <a:spcPts val="1600"/>
               </a:spcBef>
@@ -1531,15 +1631,19 @@
               <a:defRPr/>
             </a:lvl9pPr>
           </a:lstStyle>
-          <a:p/>
+          <a:p>
+            <a:endParaRPr/>
+          </a:p>
         </p:txBody>
       </p:sp>
       <p:sp>
         <p:nvSpPr>
           <p:cNvPr id="47" name="Google Shape;47;p11"/>
-          <p:cNvSpPr txBox="1"/>
+          <p:cNvSpPr txBox="1">
+            <a:spLocks noGrp="1"/>
+          </p:cNvSpPr>
           <p:nvPr>
-            <p:ph idx="12" type="sldNum"/>
+            <p:ph type="sldNum" idx="12"/>
           </p:nvPr>
         </p:nvSpPr>
         <p:spPr>
@@ -1552,7 +1656,7 @@
           </a:prstGeom>
         </p:spPr>
         <p:txBody>
-          <a:bodyPr anchorCtr="0" anchor="ctr" bIns="91425" lIns="91425" spcFirstLastPara="1" rIns="91425" wrap="square" tIns="91425">
+          <a:bodyPr spcFirstLastPara="1" wrap="square" lIns="91425" tIns="91425" rIns="91425" bIns="91425" anchor="ctr" anchorCtr="0">
             <a:noAutofit/>
           </a:bodyPr>
           <a:lstStyle>
@@ -1594,7 +1698,7 @@
             </a:lvl9pPr>
           </a:lstStyle>
           <a:p>
-            <a:pPr indent="0" lvl="0" marL="0" rtl="0" algn="r">
+            <a:pPr marL="0" lvl="0" indent="0" algn="r" rtl="0">
               <a:spcBef>
                 <a:spcPts val="0"/>
               </a:spcBef>
@@ -1620,11 +1724,11 @@
 </file>
 
 <file path=ppt/slideLayouts/slideLayout11.xml><?xml version="1.0" encoding="utf-8"?>
-<p:sldLayout xmlns:a="http://schemas.openxmlformats.org/drawingml/2006/main" xmlns:r="http://schemas.openxmlformats.org/officeDocument/2006/relationships" xmlns:mc="http://schemas.openxmlformats.org/markup-compatibility/2006" xmlns:mv="urn:schemas-microsoft-com:mac:vml" xmlns:p="http://schemas.openxmlformats.org/presentationml/2006/main" xmlns:c="http://schemas.openxmlformats.org/drawingml/2006/chart" xmlns:dgm="http://schemas.openxmlformats.org/drawingml/2006/diagram" xmlns:o="urn:schemas-microsoft-com:office:office" xmlns:v="urn:schemas-microsoft-com:vml" xmlns:pvml="urn:schemas-microsoft-com:office:powerpoint" xmlns:com="http://schemas.openxmlformats.org/drawingml/2006/compatibility" xmlns:p14="http://schemas.microsoft.com/office/powerpoint/2010/main" xmlns:p15="http://schemas.microsoft.com/office/powerpoint/2012/main" matchingName="Blank" type="blank">
+<p:sldLayout xmlns:a="http://schemas.openxmlformats.org/drawingml/2006/main" xmlns:r="http://schemas.openxmlformats.org/officeDocument/2006/relationships" xmlns:p="http://schemas.openxmlformats.org/presentationml/2006/main" matchingName="Blank" type="blank">
   <p:cSld name="BLANK">
     <p:spTree>
       <p:nvGrpSpPr>
-        <p:cNvPr id="48" name="Shape 48"/>
+        <p:cNvPr id="1" name="Shape 48"/>
         <p:cNvGrpSpPr/>
         <p:nvPr/>
       </p:nvGrpSpPr>
@@ -1639,9 +1743,11 @@
       <p:sp>
         <p:nvSpPr>
           <p:cNvPr id="49" name="Google Shape;49;p12"/>
-          <p:cNvSpPr txBox="1"/>
+          <p:cNvSpPr txBox="1">
+            <a:spLocks noGrp="1"/>
+          </p:cNvSpPr>
           <p:nvPr>
-            <p:ph idx="12" type="sldNum"/>
+            <p:ph type="sldNum" idx="12"/>
           </p:nvPr>
         </p:nvSpPr>
         <p:spPr>
@@ -1654,7 +1760,7 @@
           </a:prstGeom>
         </p:spPr>
         <p:txBody>
-          <a:bodyPr anchorCtr="0" anchor="ctr" bIns="91425" lIns="91425" spcFirstLastPara="1" rIns="91425" wrap="square" tIns="91425">
+          <a:bodyPr spcFirstLastPara="1" wrap="square" lIns="91425" tIns="91425" rIns="91425" bIns="91425" anchor="ctr" anchorCtr="0">
             <a:noAutofit/>
           </a:bodyPr>
           <a:lstStyle>
@@ -1696,7 +1802,7 @@
             </a:lvl9pPr>
           </a:lstStyle>
           <a:p>
-            <a:pPr indent="0" lvl="0" marL="0" rtl="0" algn="r">
+            <a:pPr marL="0" lvl="0" indent="0" algn="r" rtl="0">
               <a:spcBef>
                 <a:spcPts val="0"/>
               </a:spcBef>
@@ -1722,11 +1828,11 @@
 </file>
 
 <file path=ppt/slideLayouts/slideLayout2.xml><?xml version="1.0" encoding="utf-8"?>
-<p:sldLayout xmlns:a="http://schemas.openxmlformats.org/drawingml/2006/main" xmlns:r="http://schemas.openxmlformats.org/officeDocument/2006/relationships" xmlns:mc="http://schemas.openxmlformats.org/markup-compatibility/2006" xmlns:mv="urn:schemas-microsoft-com:mac:vml" xmlns:p="http://schemas.openxmlformats.org/presentationml/2006/main" xmlns:c="http://schemas.openxmlformats.org/drawingml/2006/chart" xmlns:dgm="http://schemas.openxmlformats.org/drawingml/2006/diagram" xmlns:o="urn:schemas-microsoft-com:office:office" xmlns:v="urn:schemas-microsoft-com:vml" xmlns:pvml="urn:schemas-microsoft-com:office:powerpoint" xmlns:com="http://schemas.openxmlformats.org/drawingml/2006/compatibility" xmlns:p14="http://schemas.microsoft.com/office/powerpoint/2010/main" xmlns:p15="http://schemas.microsoft.com/office/powerpoint/2012/main" matchingName="Section header" type="secHead">
+<p:sldLayout xmlns:a="http://schemas.openxmlformats.org/drawingml/2006/main" xmlns:r="http://schemas.openxmlformats.org/officeDocument/2006/relationships" xmlns:p="http://schemas.openxmlformats.org/presentationml/2006/main" matchingName="Section header" type="secHead">
   <p:cSld name="SECTION_HEADER">
     <p:spTree>
       <p:nvGrpSpPr>
-        <p:cNvPr id="13" name="Shape 13"/>
+        <p:cNvPr id="1" name="Shape 13"/>
         <p:cNvGrpSpPr/>
         <p:nvPr/>
       </p:nvGrpSpPr>
@@ -1741,7 +1847,9 @@
       <p:sp>
         <p:nvSpPr>
           <p:cNvPr id="14" name="Google Shape;14;p3"/>
-          <p:cNvSpPr txBox="1"/>
+          <p:cNvSpPr txBox="1">
+            <a:spLocks noGrp="1"/>
+          </p:cNvSpPr>
           <p:nvPr>
             <p:ph type="title"/>
           </p:nvPr>
@@ -1756,7 +1864,7 @@
           </a:prstGeom>
         </p:spPr>
         <p:txBody>
-          <a:bodyPr anchorCtr="0" anchor="ctr" bIns="91425" lIns="91425" spcFirstLastPara="1" rIns="91425" wrap="square" tIns="91425"/>
+          <a:bodyPr spcFirstLastPara="1" wrap="square" lIns="91425" tIns="91425" rIns="91425" bIns="91425" anchor="ctr" anchorCtr="0"/>
           <a:lstStyle>
             <a:lvl1pPr lvl="0" algn="ctr">
               <a:spcBef>
@@ -1858,15 +1966,19 @@
               <a:defRPr sz="3600"/>
             </a:lvl9pPr>
           </a:lstStyle>
-          <a:p/>
+          <a:p>
+            <a:endParaRPr/>
+          </a:p>
         </p:txBody>
       </p:sp>
       <p:sp>
         <p:nvSpPr>
           <p:cNvPr id="15" name="Google Shape;15;p3"/>
-          <p:cNvSpPr txBox="1"/>
+          <p:cNvSpPr txBox="1">
+            <a:spLocks noGrp="1"/>
+          </p:cNvSpPr>
           <p:nvPr>
-            <p:ph idx="12" type="sldNum"/>
+            <p:ph type="sldNum" idx="12"/>
           </p:nvPr>
         </p:nvSpPr>
         <p:spPr>
@@ -1879,7 +1991,7 @@
           </a:prstGeom>
         </p:spPr>
         <p:txBody>
-          <a:bodyPr anchorCtr="0" anchor="ctr" bIns="91425" lIns="91425" spcFirstLastPara="1" rIns="91425" wrap="square" tIns="91425">
+          <a:bodyPr spcFirstLastPara="1" wrap="square" lIns="91425" tIns="91425" rIns="91425" bIns="91425" anchor="ctr" anchorCtr="0">
             <a:noAutofit/>
           </a:bodyPr>
           <a:lstStyle>
@@ -1921,7 +2033,7 @@
             </a:lvl9pPr>
           </a:lstStyle>
           <a:p>
-            <a:pPr indent="0" lvl="0" marL="0" rtl="0" algn="r">
+            <a:pPr marL="0" lvl="0" indent="0" algn="r" rtl="0">
               <a:spcBef>
                 <a:spcPts val="0"/>
               </a:spcBef>
@@ -1947,11 +2059,11 @@
 </file>
 
 <file path=ppt/slideLayouts/slideLayout3.xml><?xml version="1.0" encoding="utf-8"?>
-<p:sldLayout xmlns:a="http://schemas.openxmlformats.org/drawingml/2006/main" xmlns:r="http://schemas.openxmlformats.org/officeDocument/2006/relationships" xmlns:mc="http://schemas.openxmlformats.org/markup-compatibility/2006" xmlns:mv="urn:schemas-microsoft-com:mac:vml" xmlns:p="http://schemas.openxmlformats.org/presentationml/2006/main" xmlns:c="http://schemas.openxmlformats.org/drawingml/2006/chart" xmlns:dgm="http://schemas.openxmlformats.org/drawingml/2006/diagram" xmlns:o="urn:schemas-microsoft-com:office:office" xmlns:v="urn:schemas-microsoft-com:vml" xmlns:pvml="urn:schemas-microsoft-com:office:powerpoint" xmlns:com="http://schemas.openxmlformats.org/drawingml/2006/compatibility" xmlns:p14="http://schemas.microsoft.com/office/powerpoint/2010/main" xmlns:p15="http://schemas.microsoft.com/office/powerpoint/2012/main" matchingName="Title and body" type="tx">
+<p:sldLayout xmlns:a="http://schemas.openxmlformats.org/drawingml/2006/main" xmlns:r="http://schemas.openxmlformats.org/officeDocument/2006/relationships" xmlns:p="http://schemas.openxmlformats.org/presentationml/2006/main" matchingName="Title and body" type="tx">
   <p:cSld name="TITLE_AND_BODY">
     <p:spTree>
       <p:nvGrpSpPr>
-        <p:cNvPr id="16" name="Shape 16"/>
+        <p:cNvPr id="1" name="Shape 16"/>
         <p:cNvGrpSpPr/>
         <p:nvPr/>
       </p:nvGrpSpPr>
@@ -1966,7 +2078,9 @@
       <p:sp>
         <p:nvSpPr>
           <p:cNvPr id="17" name="Google Shape;17;p4"/>
-          <p:cNvSpPr txBox="1"/>
+          <p:cNvSpPr txBox="1">
+            <a:spLocks noGrp="1"/>
+          </p:cNvSpPr>
           <p:nvPr>
             <p:ph type="title"/>
           </p:nvPr>
@@ -1981,7 +2095,7 @@
           </a:prstGeom>
         </p:spPr>
         <p:txBody>
-          <a:bodyPr anchorCtr="0" anchor="t" bIns="91425" lIns="91425" spcFirstLastPara="1" rIns="91425" wrap="square" tIns="91425"/>
+          <a:bodyPr spcFirstLastPara="1" wrap="square" lIns="91425" tIns="91425" rIns="91425" bIns="91425" anchor="t" anchorCtr="0"/>
           <a:lstStyle>
             <a:lvl1pPr lvl="0">
               <a:spcBef>
@@ -2083,15 +2197,19 @@
               <a:defRPr/>
             </a:lvl9pPr>
           </a:lstStyle>
-          <a:p/>
+          <a:p>
+            <a:endParaRPr/>
+          </a:p>
         </p:txBody>
       </p:sp>
       <p:sp>
         <p:nvSpPr>
           <p:cNvPr id="18" name="Google Shape;18;p4"/>
-          <p:cNvSpPr txBox="1"/>
+          <p:cNvSpPr txBox="1">
+            <a:spLocks noGrp="1"/>
+          </p:cNvSpPr>
           <p:nvPr>
-            <p:ph idx="1" type="body"/>
+            <p:ph type="body" idx="1"/>
           </p:nvPr>
         </p:nvSpPr>
         <p:spPr>
@@ -2104,9 +2222,9 @@
           </a:prstGeom>
         </p:spPr>
         <p:txBody>
-          <a:bodyPr anchorCtr="0" anchor="t" bIns="91425" lIns="91425" spcFirstLastPara="1" rIns="91425" wrap="square" tIns="91425"/>
+          <a:bodyPr spcFirstLastPara="1" wrap="square" lIns="91425" tIns="91425" rIns="91425" bIns="91425" anchor="t" anchorCtr="0"/>
           <a:lstStyle>
-            <a:lvl1pPr indent="-342900" lvl="0" marL="457200">
+            <a:lvl1pPr marL="457200" lvl="0" indent="-342900">
               <a:spcBef>
                 <a:spcPts val="0"/>
               </a:spcBef>
@@ -2117,7 +2235,7 @@
               <a:buChar char="●"/>
               <a:defRPr/>
             </a:lvl1pPr>
-            <a:lvl2pPr indent="-317500" lvl="1" marL="914400">
+            <a:lvl2pPr marL="914400" lvl="1" indent="-317500">
               <a:spcBef>
                 <a:spcPts val="1600"/>
               </a:spcBef>
@@ -2128,7 +2246,7 @@
               <a:buChar char="○"/>
               <a:defRPr/>
             </a:lvl2pPr>
-            <a:lvl3pPr indent="-317500" lvl="2" marL="1371600">
+            <a:lvl3pPr marL="1371600" lvl="2" indent="-317500">
               <a:spcBef>
                 <a:spcPts val="1600"/>
               </a:spcBef>
@@ -2139,7 +2257,7 @@
               <a:buChar char="■"/>
               <a:defRPr/>
             </a:lvl3pPr>
-            <a:lvl4pPr indent="-317500" lvl="3" marL="1828800">
+            <a:lvl4pPr marL="1828800" lvl="3" indent="-317500">
               <a:spcBef>
                 <a:spcPts val="1600"/>
               </a:spcBef>
@@ -2150,7 +2268,7 @@
               <a:buChar char="●"/>
               <a:defRPr/>
             </a:lvl4pPr>
-            <a:lvl5pPr indent="-317500" lvl="4" marL="2286000">
+            <a:lvl5pPr marL="2286000" lvl="4" indent="-317500">
               <a:spcBef>
                 <a:spcPts val="1600"/>
               </a:spcBef>
@@ -2161,7 +2279,7 @@
               <a:buChar char="○"/>
               <a:defRPr/>
             </a:lvl5pPr>
-            <a:lvl6pPr indent="-317500" lvl="5" marL="2743200">
+            <a:lvl6pPr marL="2743200" lvl="5" indent="-317500">
               <a:spcBef>
                 <a:spcPts val="1600"/>
               </a:spcBef>
@@ -2172,7 +2290,7 @@
               <a:buChar char="■"/>
               <a:defRPr/>
             </a:lvl6pPr>
-            <a:lvl7pPr indent="-317500" lvl="6" marL="3200400">
+            <a:lvl7pPr marL="3200400" lvl="6" indent="-317500">
               <a:spcBef>
                 <a:spcPts val="1600"/>
               </a:spcBef>
@@ -2183,7 +2301,7 @@
               <a:buChar char="●"/>
               <a:defRPr/>
             </a:lvl7pPr>
-            <a:lvl8pPr indent="-317500" lvl="7" marL="3657600">
+            <a:lvl8pPr marL="3657600" lvl="7" indent="-317500">
               <a:spcBef>
                 <a:spcPts val="1600"/>
               </a:spcBef>
@@ -2194,7 +2312,7 @@
               <a:buChar char="○"/>
               <a:defRPr/>
             </a:lvl8pPr>
-            <a:lvl9pPr indent="-317500" lvl="8" marL="4114800">
+            <a:lvl9pPr marL="4114800" lvl="8" indent="-317500">
               <a:spcBef>
                 <a:spcPts val="1600"/>
               </a:spcBef>
@@ -2206,15 +2324,19 @@
               <a:defRPr/>
             </a:lvl9pPr>
           </a:lstStyle>
-          <a:p/>
+          <a:p>
+            <a:endParaRPr/>
+          </a:p>
         </p:txBody>
       </p:sp>
       <p:sp>
         <p:nvSpPr>
           <p:cNvPr id="19" name="Google Shape;19;p4"/>
-          <p:cNvSpPr txBox="1"/>
+          <p:cNvSpPr txBox="1">
+            <a:spLocks noGrp="1"/>
+          </p:cNvSpPr>
           <p:nvPr>
-            <p:ph idx="12" type="sldNum"/>
+            <p:ph type="sldNum" idx="12"/>
           </p:nvPr>
         </p:nvSpPr>
         <p:spPr>
@@ -2227,7 +2349,7 @@
           </a:prstGeom>
         </p:spPr>
         <p:txBody>
-          <a:bodyPr anchorCtr="0" anchor="ctr" bIns="91425" lIns="91425" spcFirstLastPara="1" rIns="91425" wrap="square" tIns="91425">
+          <a:bodyPr spcFirstLastPara="1" wrap="square" lIns="91425" tIns="91425" rIns="91425" bIns="91425" anchor="ctr" anchorCtr="0">
             <a:noAutofit/>
           </a:bodyPr>
           <a:lstStyle>
@@ -2269,7 +2391,7 @@
             </a:lvl9pPr>
           </a:lstStyle>
           <a:p>
-            <a:pPr indent="0" lvl="0" marL="0" rtl="0" algn="r">
+            <a:pPr marL="0" lvl="0" indent="0" algn="r" rtl="0">
               <a:spcBef>
                 <a:spcPts val="0"/>
               </a:spcBef>
@@ -2295,11 +2417,11 @@
 </file>
 
 <file path=ppt/slideLayouts/slideLayout4.xml><?xml version="1.0" encoding="utf-8"?>
-<p:sldLayout xmlns:a="http://schemas.openxmlformats.org/drawingml/2006/main" xmlns:r="http://schemas.openxmlformats.org/officeDocument/2006/relationships" xmlns:mc="http://schemas.openxmlformats.org/markup-compatibility/2006" xmlns:mv="urn:schemas-microsoft-com:mac:vml" xmlns:p="http://schemas.openxmlformats.org/presentationml/2006/main" xmlns:c="http://schemas.openxmlformats.org/drawingml/2006/chart" xmlns:dgm="http://schemas.openxmlformats.org/drawingml/2006/diagram" xmlns:o="urn:schemas-microsoft-com:office:office" xmlns:v="urn:schemas-microsoft-com:vml" xmlns:pvml="urn:schemas-microsoft-com:office:powerpoint" xmlns:com="http://schemas.openxmlformats.org/drawingml/2006/compatibility" xmlns:p14="http://schemas.microsoft.com/office/powerpoint/2010/main" xmlns:p15="http://schemas.microsoft.com/office/powerpoint/2012/main" matchingName="Title and two columns" type="twoColTx">
+<p:sldLayout xmlns:a="http://schemas.openxmlformats.org/drawingml/2006/main" xmlns:r="http://schemas.openxmlformats.org/officeDocument/2006/relationships" xmlns:p="http://schemas.openxmlformats.org/presentationml/2006/main" matchingName="Title and two columns" type="twoColTx">
   <p:cSld name="TITLE_AND_TWO_COLUMNS">
     <p:spTree>
       <p:nvGrpSpPr>
-        <p:cNvPr id="20" name="Shape 20"/>
+        <p:cNvPr id="1" name="Shape 20"/>
         <p:cNvGrpSpPr/>
         <p:nvPr/>
       </p:nvGrpSpPr>
@@ -2314,7 +2436,9 @@
       <p:sp>
         <p:nvSpPr>
           <p:cNvPr id="21" name="Google Shape;21;p5"/>
-          <p:cNvSpPr txBox="1"/>
+          <p:cNvSpPr txBox="1">
+            <a:spLocks noGrp="1"/>
+          </p:cNvSpPr>
           <p:nvPr>
             <p:ph type="title"/>
           </p:nvPr>
@@ -2329,7 +2453,7 @@
           </a:prstGeom>
         </p:spPr>
         <p:txBody>
-          <a:bodyPr anchorCtr="0" anchor="t" bIns="91425" lIns="91425" spcFirstLastPara="1" rIns="91425" wrap="square" tIns="91425"/>
+          <a:bodyPr spcFirstLastPara="1" wrap="square" lIns="91425" tIns="91425" rIns="91425" bIns="91425" anchor="t" anchorCtr="0"/>
           <a:lstStyle>
             <a:lvl1pPr lvl="0">
               <a:spcBef>
@@ -2431,15 +2555,19 @@
               <a:defRPr/>
             </a:lvl9pPr>
           </a:lstStyle>
-          <a:p/>
+          <a:p>
+            <a:endParaRPr/>
+          </a:p>
         </p:txBody>
       </p:sp>
       <p:sp>
         <p:nvSpPr>
           <p:cNvPr id="22" name="Google Shape;22;p5"/>
-          <p:cNvSpPr txBox="1"/>
+          <p:cNvSpPr txBox="1">
+            <a:spLocks noGrp="1"/>
+          </p:cNvSpPr>
           <p:nvPr>
-            <p:ph idx="1" type="body"/>
+            <p:ph type="body" idx="1"/>
           </p:nvPr>
         </p:nvSpPr>
         <p:spPr>
@@ -2452,9 +2580,9 @@
           </a:prstGeom>
         </p:spPr>
         <p:txBody>
-          <a:bodyPr anchorCtr="0" anchor="t" bIns="91425" lIns="91425" spcFirstLastPara="1" rIns="91425" wrap="square" tIns="91425"/>
+          <a:bodyPr spcFirstLastPara="1" wrap="square" lIns="91425" tIns="91425" rIns="91425" bIns="91425" anchor="t" anchorCtr="0"/>
           <a:lstStyle>
-            <a:lvl1pPr indent="-317500" lvl="0" marL="457200">
+            <a:lvl1pPr marL="457200" lvl="0" indent="-317500">
               <a:spcBef>
                 <a:spcPts val="0"/>
               </a:spcBef>
@@ -2465,7 +2593,7 @@
               <a:buChar char="●"/>
               <a:defRPr sz="1400"/>
             </a:lvl1pPr>
-            <a:lvl2pPr indent="-304800" lvl="1" marL="914400">
+            <a:lvl2pPr marL="914400" lvl="1" indent="-304800">
               <a:spcBef>
                 <a:spcPts val="1600"/>
               </a:spcBef>
@@ -2476,7 +2604,7 @@
               <a:buChar char="○"/>
               <a:defRPr sz="1200"/>
             </a:lvl2pPr>
-            <a:lvl3pPr indent="-304800" lvl="2" marL="1371600">
+            <a:lvl3pPr marL="1371600" lvl="2" indent="-304800">
               <a:spcBef>
                 <a:spcPts val="1600"/>
               </a:spcBef>
@@ -2487,7 +2615,7 @@
               <a:buChar char="■"/>
               <a:defRPr sz="1200"/>
             </a:lvl3pPr>
-            <a:lvl4pPr indent="-304800" lvl="3" marL="1828800">
+            <a:lvl4pPr marL="1828800" lvl="3" indent="-304800">
               <a:spcBef>
                 <a:spcPts val="1600"/>
               </a:spcBef>
@@ -2498,7 +2626,7 @@
               <a:buChar char="●"/>
               <a:defRPr sz="1200"/>
             </a:lvl4pPr>
-            <a:lvl5pPr indent="-304800" lvl="4" marL="2286000">
+            <a:lvl5pPr marL="2286000" lvl="4" indent="-304800">
               <a:spcBef>
                 <a:spcPts val="1600"/>
               </a:spcBef>
@@ -2509,7 +2637,7 @@
               <a:buChar char="○"/>
               <a:defRPr sz="1200"/>
             </a:lvl5pPr>
-            <a:lvl6pPr indent="-304800" lvl="5" marL="2743200">
+            <a:lvl6pPr marL="2743200" lvl="5" indent="-304800">
               <a:spcBef>
                 <a:spcPts val="1600"/>
               </a:spcBef>
@@ -2520,7 +2648,7 @@
               <a:buChar char="■"/>
               <a:defRPr sz="1200"/>
             </a:lvl6pPr>
-            <a:lvl7pPr indent="-304800" lvl="6" marL="3200400">
+            <a:lvl7pPr marL="3200400" lvl="6" indent="-304800">
               <a:spcBef>
                 <a:spcPts val="1600"/>
               </a:spcBef>
@@ -2531,7 +2659,7 @@
               <a:buChar char="●"/>
               <a:defRPr sz="1200"/>
             </a:lvl7pPr>
-            <a:lvl8pPr indent="-304800" lvl="7" marL="3657600">
+            <a:lvl8pPr marL="3657600" lvl="7" indent="-304800">
               <a:spcBef>
                 <a:spcPts val="1600"/>
               </a:spcBef>
@@ -2542,7 +2670,7 @@
               <a:buChar char="○"/>
               <a:defRPr sz="1200"/>
             </a:lvl8pPr>
-            <a:lvl9pPr indent="-304800" lvl="8" marL="4114800">
+            <a:lvl9pPr marL="4114800" lvl="8" indent="-304800">
               <a:spcBef>
                 <a:spcPts val="1600"/>
               </a:spcBef>
@@ -2554,15 +2682,19 @@
               <a:defRPr sz="1200"/>
             </a:lvl9pPr>
           </a:lstStyle>
-          <a:p/>
+          <a:p>
+            <a:endParaRPr/>
+          </a:p>
         </p:txBody>
       </p:sp>
       <p:sp>
         <p:nvSpPr>
           <p:cNvPr id="23" name="Google Shape;23;p5"/>
-          <p:cNvSpPr txBox="1"/>
+          <p:cNvSpPr txBox="1">
+            <a:spLocks noGrp="1"/>
+          </p:cNvSpPr>
           <p:nvPr>
-            <p:ph idx="2" type="body"/>
+            <p:ph type="body" idx="2"/>
           </p:nvPr>
         </p:nvSpPr>
         <p:spPr>
@@ -2575,9 +2707,9 @@
           </a:prstGeom>
         </p:spPr>
         <p:txBody>
-          <a:bodyPr anchorCtr="0" anchor="t" bIns="91425" lIns="91425" spcFirstLastPara="1" rIns="91425" wrap="square" tIns="91425"/>
+          <a:bodyPr spcFirstLastPara="1" wrap="square" lIns="91425" tIns="91425" rIns="91425" bIns="91425" anchor="t" anchorCtr="0"/>
           <a:lstStyle>
-            <a:lvl1pPr indent="-317500" lvl="0" marL="457200">
+            <a:lvl1pPr marL="457200" lvl="0" indent="-317500">
               <a:spcBef>
                 <a:spcPts val="0"/>
               </a:spcBef>
@@ -2588,7 +2720,7 @@
               <a:buChar char="●"/>
               <a:defRPr sz="1400"/>
             </a:lvl1pPr>
-            <a:lvl2pPr indent="-304800" lvl="1" marL="914400">
+            <a:lvl2pPr marL="914400" lvl="1" indent="-304800">
               <a:spcBef>
                 <a:spcPts val="1600"/>
               </a:spcBef>
@@ -2599,7 +2731,7 @@
               <a:buChar char="○"/>
               <a:defRPr sz="1200"/>
             </a:lvl2pPr>
-            <a:lvl3pPr indent="-304800" lvl="2" marL="1371600">
+            <a:lvl3pPr marL="1371600" lvl="2" indent="-304800">
               <a:spcBef>
                 <a:spcPts val="1600"/>
               </a:spcBef>
@@ -2610,7 +2742,7 @@
               <a:buChar char="■"/>
               <a:defRPr sz="1200"/>
             </a:lvl3pPr>
-            <a:lvl4pPr indent="-304800" lvl="3" marL="1828800">
+            <a:lvl4pPr marL="1828800" lvl="3" indent="-304800">
               <a:spcBef>
                 <a:spcPts val="1600"/>
               </a:spcBef>
@@ -2621,7 +2753,7 @@
               <a:buChar char="●"/>
               <a:defRPr sz="1200"/>
             </a:lvl4pPr>
-            <a:lvl5pPr indent="-304800" lvl="4" marL="2286000">
+            <a:lvl5pPr marL="2286000" lvl="4" indent="-304800">
               <a:spcBef>
                 <a:spcPts val="1600"/>
               </a:spcBef>
@@ -2632,7 +2764,7 @@
               <a:buChar char="○"/>
               <a:defRPr sz="1200"/>
             </a:lvl5pPr>
-            <a:lvl6pPr indent="-304800" lvl="5" marL="2743200">
+            <a:lvl6pPr marL="2743200" lvl="5" indent="-304800">
               <a:spcBef>
                 <a:spcPts val="1600"/>
               </a:spcBef>
@@ -2643,7 +2775,7 @@
               <a:buChar char="■"/>
               <a:defRPr sz="1200"/>
             </a:lvl6pPr>
-            <a:lvl7pPr indent="-304800" lvl="6" marL="3200400">
+            <a:lvl7pPr marL="3200400" lvl="6" indent="-304800">
               <a:spcBef>
                 <a:spcPts val="1600"/>
               </a:spcBef>
@@ -2654,7 +2786,7 @@
               <a:buChar char="●"/>
               <a:defRPr sz="1200"/>
             </a:lvl7pPr>
-            <a:lvl8pPr indent="-304800" lvl="7" marL="3657600">
+            <a:lvl8pPr marL="3657600" lvl="7" indent="-304800">
               <a:spcBef>
                 <a:spcPts val="1600"/>
               </a:spcBef>
@@ -2665,7 +2797,7 @@
               <a:buChar char="○"/>
               <a:defRPr sz="1200"/>
             </a:lvl8pPr>
-            <a:lvl9pPr indent="-304800" lvl="8" marL="4114800">
+            <a:lvl9pPr marL="4114800" lvl="8" indent="-304800">
               <a:spcBef>
                 <a:spcPts val="1600"/>
               </a:spcBef>
@@ -2677,15 +2809,19 @@
               <a:defRPr sz="1200"/>
             </a:lvl9pPr>
           </a:lstStyle>
-          <a:p/>
+          <a:p>
+            <a:endParaRPr/>
+          </a:p>
         </p:txBody>
       </p:sp>
       <p:sp>
         <p:nvSpPr>
           <p:cNvPr id="24" name="Google Shape;24;p5"/>
-          <p:cNvSpPr txBox="1"/>
+          <p:cNvSpPr txBox="1">
+            <a:spLocks noGrp="1"/>
+          </p:cNvSpPr>
           <p:nvPr>
-            <p:ph idx="12" type="sldNum"/>
+            <p:ph type="sldNum" idx="12"/>
           </p:nvPr>
         </p:nvSpPr>
         <p:spPr>
@@ -2698,7 +2834,7 @@
           </a:prstGeom>
         </p:spPr>
         <p:txBody>
-          <a:bodyPr anchorCtr="0" anchor="ctr" bIns="91425" lIns="91425" spcFirstLastPara="1" rIns="91425" wrap="square" tIns="91425">
+          <a:bodyPr spcFirstLastPara="1" wrap="square" lIns="91425" tIns="91425" rIns="91425" bIns="91425" anchor="ctr" anchorCtr="0">
             <a:noAutofit/>
           </a:bodyPr>
           <a:lstStyle>
@@ -2740,7 +2876,7 @@
             </a:lvl9pPr>
           </a:lstStyle>
           <a:p>
-            <a:pPr indent="0" lvl="0" marL="0" rtl="0" algn="r">
+            <a:pPr marL="0" lvl="0" indent="0" algn="r" rtl="0">
               <a:spcBef>
                 <a:spcPts val="0"/>
               </a:spcBef>
@@ -2766,11 +2902,11 @@
 </file>
 
 <file path=ppt/slideLayouts/slideLayout5.xml><?xml version="1.0" encoding="utf-8"?>
-<p:sldLayout xmlns:a="http://schemas.openxmlformats.org/drawingml/2006/main" xmlns:r="http://schemas.openxmlformats.org/officeDocument/2006/relationships" xmlns:mc="http://schemas.openxmlformats.org/markup-compatibility/2006" xmlns:mv="urn:schemas-microsoft-com:mac:vml" xmlns:p="http://schemas.openxmlformats.org/presentationml/2006/main" xmlns:c="http://schemas.openxmlformats.org/drawingml/2006/chart" xmlns:dgm="http://schemas.openxmlformats.org/drawingml/2006/diagram" xmlns:o="urn:schemas-microsoft-com:office:office" xmlns:v="urn:schemas-microsoft-com:vml" xmlns:pvml="urn:schemas-microsoft-com:office:powerpoint" xmlns:com="http://schemas.openxmlformats.org/drawingml/2006/compatibility" xmlns:p14="http://schemas.microsoft.com/office/powerpoint/2010/main" xmlns:p15="http://schemas.microsoft.com/office/powerpoint/2012/main" matchingName="Title only" type="titleOnly">
+<p:sldLayout xmlns:a="http://schemas.openxmlformats.org/drawingml/2006/main" xmlns:r="http://schemas.openxmlformats.org/officeDocument/2006/relationships" xmlns:p="http://schemas.openxmlformats.org/presentationml/2006/main" matchingName="Title only" type="titleOnly">
   <p:cSld name="TITLE_ONLY">
     <p:spTree>
       <p:nvGrpSpPr>
-        <p:cNvPr id="25" name="Shape 25"/>
+        <p:cNvPr id="1" name="Shape 25"/>
         <p:cNvGrpSpPr/>
         <p:nvPr/>
       </p:nvGrpSpPr>
@@ -2785,7 +2921,9 @@
       <p:sp>
         <p:nvSpPr>
           <p:cNvPr id="26" name="Google Shape;26;p6"/>
-          <p:cNvSpPr txBox="1"/>
+          <p:cNvSpPr txBox="1">
+            <a:spLocks noGrp="1"/>
+          </p:cNvSpPr>
           <p:nvPr>
             <p:ph type="title"/>
           </p:nvPr>
@@ -2800,7 +2938,7 @@
           </a:prstGeom>
         </p:spPr>
         <p:txBody>
-          <a:bodyPr anchorCtr="0" anchor="t" bIns="91425" lIns="91425" spcFirstLastPara="1" rIns="91425" wrap="square" tIns="91425"/>
+          <a:bodyPr spcFirstLastPara="1" wrap="square" lIns="91425" tIns="91425" rIns="91425" bIns="91425" anchor="t" anchorCtr="0"/>
           <a:lstStyle>
             <a:lvl1pPr lvl="0">
               <a:spcBef>
@@ -2902,15 +3040,19 @@
               <a:defRPr/>
             </a:lvl9pPr>
           </a:lstStyle>
-          <a:p/>
+          <a:p>
+            <a:endParaRPr/>
+          </a:p>
         </p:txBody>
       </p:sp>
       <p:sp>
         <p:nvSpPr>
           <p:cNvPr id="27" name="Google Shape;27;p6"/>
-          <p:cNvSpPr txBox="1"/>
+          <p:cNvSpPr txBox="1">
+            <a:spLocks noGrp="1"/>
+          </p:cNvSpPr>
           <p:nvPr>
-            <p:ph idx="12" type="sldNum"/>
+            <p:ph type="sldNum" idx="12"/>
           </p:nvPr>
         </p:nvSpPr>
         <p:spPr>
@@ -2923,7 +3065,7 @@
           </a:prstGeom>
         </p:spPr>
         <p:txBody>
-          <a:bodyPr anchorCtr="0" anchor="ctr" bIns="91425" lIns="91425" spcFirstLastPara="1" rIns="91425" wrap="square" tIns="91425">
+          <a:bodyPr spcFirstLastPara="1" wrap="square" lIns="91425" tIns="91425" rIns="91425" bIns="91425" anchor="ctr" anchorCtr="0">
             <a:noAutofit/>
           </a:bodyPr>
           <a:lstStyle>
@@ -2965,7 +3107,7 @@
             </a:lvl9pPr>
           </a:lstStyle>
           <a:p>
-            <a:pPr indent="0" lvl="0" marL="0" rtl="0" algn="r">
+            <a:pPr marL="0" lvl="0" indent="0" algn="r" rtl="0">
               <a:spcBef>
                 <a:spcPts val="0"/>
               </a:spcBef>
@@ -2991,11 +3133,11 @@
 </file>
 
 <file path=ppt/slideLayouts/slideLayout6.xml><?xml version="1.0" encoding="utf-8"?>
-<p:sldLayout xmlns:a="http://schemas.openxmlformats.org/drawingml/2006/main" xmlns:r="http://schemas.openxmlformats.org/officeDocument/2006/relationships" xmlns:mc="http://schemas.openxmlformats.org/markup-compatibility/2006" xmlns:mv="urn:schemas-microsoft-com:mac:vml" xmlns:p="http://schemas.openxmlformats.org/presentationml/2006/main" xmlns:c="http://schemas.openxmlformats.org/drawingml/2006/chart" xmlns:dgm="http://schemas.openxmlformats.org/drawingml/2006/diagram" xmlns:o="urn:schemas-microsoft-com:office:office" xmlns:v="urn:schemas-microsoft-com:vml" xmlns:pvml="urn:schemas-microsoft-com:office:powerpoint" xmlns:com="http://schemas.openxmlformats.org/drawingml/2006/compatibility" xmlns:p14="http://schemas.microsoft.com/office/powerpoint/2010/main" xmlns:p15="http://schemas.microsoft.com/office/powerpoint/2012/main" matchingName="One column text">
+<p:sldLayout xmlns:a="http://schemas.openxmlformats.org/drawingml/2006/main" xmlns:r="http://schemas.openxmlformats.org/officeDocument/2006/relationships" xmlns:p="http://schemas.openxmlformats.org/presentationml/2006/main" matchingName="One column text">
   <p:cSld name="ONE_COLUMN_TEXT">
     <p:spTree>
       <p:nvGrpSpPr>
-        <p:cNvPr id="28" name="Shape 28"/>
+        <p:cNvPr id="1" name="Shape 28"/>
         <p:cNvGrpSpPr/>
         <p:nvPr/>
       </p:nvGrpSpPr>
@@ -3010,7 +3152,9 @@
       <p:sp>
         <p:nvSpPr>
           <p:cNvPr id="29" name="Google Shape;29;p7"/>
-          <p:cNvSpPr txBox="1"/>
+          <p:cNvSpPr txBox="1">
+            <a:spLocks noGrp="1"/>
+          </p:cNvSpPr>
           <p:nvPr>
             <p:ph type="title"/>
           </p:nvPr>
@@ -3025,7 +3169,7 @@
           </a:prstGeom>
         </p:spPr>
         <p:txBody>
-          <a:bodyPr anchorCtr="0" anchor="b" bIns="91425" lIns="91425" spcFirstLastPara="1" rIns="91425" wrap="square" tIns="91425"/>
+          <a:bodyPr spcFirstLastPara="1" wrap="square" lIns="91425" tIns="91425" rIns="91425" bIns="91425" anchor="b" anchorCtr="0"/>
           <a:lstStyle>
             <a:lvl1pPr lvl="0">
               <a:spcBef>
@@ -3127,15 +3271,19 @@
               <a:defRPr sz="2400"/>
             </a:lvl9pPr>
           </a:lstStyle>
-          <a:p/>
+          <a:p>
+            <a:endParaRPr/>
+          </a:p>
         </p:txBody>
       </p:sp>
       <p:sp>
         <p:nvSpPr>
           <p:cNvPr id="30" name="Google Shape;30;p7"/>
-          <p:cNvSpPr txBox="1"/>
+          <p:cNvSpPr txBox="1">
+            <a:spLocks noGrp="1"/>
+          </p:cNvSpPr>
           <p:nvPr>
-            <p:ph idx="1" type="body"/>
+            <p:ph type="body" idx="1"/>
           </p:nvPr>
         </p:nvSpPr>
         <p:spPr>
@@ -3148,9 +3296,9 @@
           </a:prstGeom>
         </p:spPr>
         <p:txBody>
-          <a:bodyPr anchorCtr="0" anchor="t" bIns="91425" lIns="91425" spcFirstLastPara="1" rIns="91425" wrap="square" tIns="91425"/>
+          <a:bodyPr spcFirstLastPara="1" wrap="square" lIns="91425" tIns="91425" rIns="91425" bIns="91425" anchor="t" anchorCtr="0"/>
           <a:lstStyle>
-            <a:lvl1pPr indent="-304800" lvl="0" marL="457200">
+            <a:lvl1pPr marL="457200" lvl="0" indent="-304800">
               <a:spcBef>
                 <a:spcPts val="0"/>
               </a:spcBef>
@@ -3161,7 +3309,7 @@
               <a:buChar char="●"/>
               <a:defRPr sz="1200"/>
             </a:lvl1pPr>
-            <a:lvl2pPr indent="-304800" lvl="1" marL="914400">
+            <a:lvl2pPr marL="914400" lvl="1" indent="-304800">
               <a:spcBef>
                 <a:spcPts val="1600"/>
               </a:spcBef>
@@ -3172,7 +3320,7 @@
               <a:buChar char="○"/>
               <a:defRPr sz="1200"/>
             </a:lvl2pPr>
-            <a:lvl3pPr indent="-304800" lvl="2" marL="1371600">
+            <a:lvl3pPr marL="1371600" lvl="2" indent="-304800">
               <a:spcBef>
                 <a:spcPts val="1600"/>
               </a:spcBef>
@@ -3183,7 +3331,7 @@
               <a:buChar char="■"/>
               <a:defRPr sz="1200"/>
             </a:lvl3pPr>
-            <a:lvl4pPr indent="-304800" lvl="3" marL="1828800">
+            <a:lvl4pPr marL="1828800" lvl="3" indent="-304800">
               <a:spcBef>
                 <a:spcPts val="1600"/>
               </a:spcBef>
@@ -3194,7 +3342,7 @@
               <a:buChar char="●"/>
               <a:defRPr sz="1200"/>
             </a:lvl4pPr>
-            <a:lvl5pPr indent="-304800" lvl="4" marL="2286000">
+            <a:lvl5pPr marL="2286000" lvl="4" indent="-304800">
               <a:spcBef>
                 <a:spcPts val="1600"/>
               </a:spcBef>
@@ -3205,7 +3353,7 @@
               <a:buChar char="○"/>
               <a:defRPr sz="1200"/>
             </a:lvl5pPr>
-            <a:lvl6pPr indent="-304800" lvl="5" marL="2743200">
+            <a:lvl6pPr marL="2743200" lvl="5" indent="-304800">
               <a:spcBef>
                 <a:spcPts val="1600"/>
               </a:spcBef>
@@ -3216,7 +3364,7 @@
               <a:buChar char="■"/>
               <a:defRPr sz="1200"/>
             </a:lvl6pPr>
-            <a:lvl7pPr indent="-304800" lvl="6" marL="3200400">
+            <a:lvl7pPr marL="3200400" lvl="6" indent="-304800">
               <a:spcBef>
                 <a:spcPts val="1600"/>
               </a:spcBef>
@@ -3227,7 +3375,7 @@
               <a:buChar char="●"/>
               <a:defRPr sz="1200"/>
             </a:lvl7pPr>
-            <a:lvl8pPr indent="-304800" lvl="7" marL="3657600">
+            <a:lvl8pPr marL="3657600" lvl="7" indent="-304800">
               <a:spcBef>
                 <a:spcPts val="1600"/>
               </a:spcBef>
@@ -3238,7 +3386,7 @@
               <a:buChar char="○"/>
               <a:defRPr sz="1200"/>
             </a:lvl8pPr>
-            <a:lvl9pPr indent="-304800" lvl="8" marL="4114800">
+            <a:lvl9pPr marL="4114800" lvl="8" indent="-304800">
               <a:spcBef>
                 <a:spcPts val="1600"/>
               </a:spcBef>
@@ -3250,15 +3398,19 @@
               <a:defRPr sz="1200"/>
             </a:lvl9pPr>
           </a:lstStyle>
-          <a:p/>
+          <a:p>
+            <a:endParaRPr/>
+          </a:p>
         </p:txBody>
       </p:sp>
       <p:sp>
         <p:nvSpPr>
           <p:cNvPr id="31" name="Google Shape;31;p7"/>
-          <p:cNvSpPr txBox="1"/>
+          <p:cNvSpPr txBox="1">
+            <a:spLocks noGrp="1"/>
+          </p:cNvSpPr>
           <p:nvPr>
-            <p:ph idx="12" type="sldNum"/>
+            <p:ph type="sldNum" idx="12"/>
           </p:nvPr>
         </p:nvSpPr>
         <p:spPr>
@@ -3271,7 +3423,7 @@
           </a:prstGeom>
         </p:spPr>
         <p:txBody>
-          <a:bodyPr anchorCtr="0" anchor="ctr" bIns="91425" lIns="91425" spcFirstLastPara="1" rIns="91425" wrap="square" tIns="91425">
+          <a:bodyPr spcFirstLastPara="1" wrap="square" lIns="91425" tIns="91425" rIns="91425" bIns="91425" anchor="ctr" anchorCtr="0">
             <a:noAutofit/>
           </a:bodyPr>
           <a:lstStyle>
@@ -3313,7 +3465,7 @@
             </a:lvl9pPr>
           </a:lstStyle>
           <a:p>
-            <a:pPr indent="0" lvl="0" marL="0" rtl="0" algn="r">
+            <a:pPr marL="0" lvl="0" indent="0" algn="r" rtl="0">
               <a:spcBef>
                 <a:spcPts val="0"/>
               </a:spcBef>
@@ -3339,11 +3491,11 @@
 </file>
 
 <file path=ppt/slideLayouts/slideLayout7.xml><?xml version="1.0" encoding="utf-8"?>
-<p:sldLayout xmlns:a="http://schemas.openxmlformats.org/drawingml/2006/main" xmlns:r="http://schemas.openxmlformats.org/officeDocument/2006/relationships" xmlns:mc="http://schemas.openxmlformats.org/markup-compatibility/2006" xmlns:mv="urn:schemas-microsoft-com:mac:vml" xmlns:p="http://schemas.openxmlformats.org/presentationml/2006/main" xmlns:c="http://schemas.openxmlformats.org/drawingml/2006/chart" xmlns:dgm="http://schemas.openxmlformats.org/drawingml/2006/diagram" xmlns:o="urn:schemas-microsoft-com:office:office" xmlns:v="urn:schemas-microsoft-com:vml" xmlns:pvml="urn:schemas-microsoft-com:office:powerpoint" xmlns:com="http://schemas.openxmlformats.org/drawingml/2006/compatibility" xmlns:p14="http://schemas.microsoft.com/office/powerpoint/2010/main" xmlns:p15="http://schemas.microsoft.com/office/powerpoint/2012/main" matchingName="Main point">
+<p:sldLayout xmlns:a="http://schemas.openxmlformats.org/drawingml/2006/main" xmlns:r="http://schemas.openxmlformats.org/officeDocument/2006/relationships" xmlns:p="http://schemas.openxmlformats.org/presentationml/2006/main" matchingName="Main point">
   <p:cSld name="MAIN_POINT">
     <p:spTree>
       <p:nvGrpSpPr>
-        <p:cNvPr id="32" name="Shape 32"/>
+        <p:cNvPr id="1" name="Shape 32"/>
         <p:cNvGrpSpPr/>
         <p:nvPr/>
       </p:nvGrpSpPr>
@@ -3358,7 +3510,9 @@
       <p:sp>
         <p:nvSpPr>
           <p:cNvPr id="33" name="Google Shape;33;p8"/>
-          <p:cNvSpPr txBox="1"/>
+          <p:cNvSpPr txBox="1">
+            <a:spLocks noGrp="1"/>
+          </p:cNvSpPr>
           <p:nvPr>
             <p:ph type="title"/>
           </p:nvPr>
@@ -3373,7 +3527,7 @@
           </a:prstGeom>
         </p:spPr>
         <p:txBody>
-          <a:bodyPr anchorCtr="0" anchor="ctr" bIns="91425" lIns="91425" spcFirstLastPara="1" rIns="91425" wrap="square" tIns="91425"/>
+          <a:bodyPr spcFirstLastPara="1" wrap="square" lIns="91425" tIns="91425" rIns="91425" bIns="91425" anchor="ctr" anchorCtr="0"/>
           <a:lstStyle>
             <a:lvl1pPr lvl="0">
               <a:spcBef>
@@ -3475,15 +3629,19 @@
               <a:defRPr sz="4800"/>
             </a:lvl9pPr>
           </a:lstStyle>
-          <a:p/>
+          <a:p>
+            <a:endParaRPr/>
+          </a:p>
         </p:txBody>
       </p:sp>
       <p:sp>
         <p:nvSpPr>
           <p:cNvPr id="34" name="Google Shape;34;p8"/>
-          <p:cNvSpPr txBox="1"/>
+          <p:cNvSpPr txBox="1">
+            <a:spLocks noGrp="1"/>
+          </p:cNvSpPr>
           <p:nvPr>
-            <p:ph idx="12" type="sldNum"/>
+            <p:ph type="sldNum" idx="12"/>
           </p:nvPr>
         </p:nvSpPr>
         <p:spPr>
@@ -3496,7 +3654,7 @@
           </a:prstGeom>
         </p:spPr>
         <p:txBody>
-          <a:bodyPr anchorCtr="0" anchor="ctr" bIns="91425" lIns="91425" spcFirstLastPara="1" rIns="91425" wrap="square" tIns="91425">
+          <a:bodyPr spcFirstLastPara="1" wrap="square" lIns="91425" tIns="91425" rIns="91425" bIns="91425" anchor="ctr" anchorCtr="0">
             <a:noAutofit/>
           </a:bodyPr>
           <a:lstStyle>
@@ -3538,7 +3696,7 @@
             </a:lvl9pPr>
           </a:lstStyle>
           <a:p>
-            <a:pPr indent="0" lvl="0" marL="0" rtl="0" algn="r">
+            <a:pPr marL="0" lvl="0" indent="0" algn="r" rtl="0">
               <a:spcBef>
                 <a:spcPts val="0"/>
               </a:spcBef>
@@ -3564,11 +3722,11 @@
 </file>
 
 <file path=ppt/slideLayouts/slideLayout8.xml><?xml version="1.0" encoding="utf-8"?>
-<p:sldLayout xmlns:a="http://schemas.openxmlformats.org/drawingml/2006/main" xmlns:r="http://schemas.openxmlformats.org/officeDocument/2006/relationships" xmlns:mc="http://schemas.openxmlformats.org/markup-compatibility/2006" xmlns:mv="urn:schemas-microsoft-com:mac:vml" xmlns:p="http://schemas.openxmlformats.org/presentationml/2006/main" xmlns:c="http://schemas.openxmlformats.org/drawingml/2006/chart" xmlns:dgm="http://schemas.openxmlformats.org/drawingml/2006/diagram" xmlns:o="urn:schemas-microsoft-com:office:office" xmlns:v="urn:schemas-microsoft-com:vml" xmlns:pvml="urn:schemas-microsoft-com:office:powerpoint" xmlns:com="http://schemas.openxmlformats.org/drawingml/2006/compatibility" xmlns:p14="http://schemas.microsoft.com/office/powerpoint/2010/main" xmlns:p15="http://schemas.microsoft.com/office/powerpoint/2012/main" matchingName="Section title and description">
+<p:sldLayout xmlns:a="http://schemas.openxmlformats.org/drawingml/2006/main" xmlns:r="http://schemas.openxmlformats.org/officeDocument/2006/relationships" xmlns:p="http://schemas.openxmlformats.org/presentationml/2006/main" matchingName="Section title and description">
   <p:cSld name="SECTION_TITLE_AND_DESCRIPTION">
     <p:spTree>
       <p:nvGrpSpPr>
-        <p:cNvPr id="35" name="Shape 35"/>
+        <p:cNvPr id="1" name="Shape 35"/>
         <p:cNvGrpSpPr/>
         <p:nvPr/>
       </p:nvGrpSpPr>
@@ -3602,12 +3760,12 @@
           </a:ln>
         </p:spPr>
         <p:txBody>
-          <a:bodyPr anchorCtr="0" anchor="ctr" bIns="91425" lIns="91425" spcFirstLastPara="1" rIns="91425" wrap="square" tIns="91425">
+          <a:bodyPr spcFirstLastPara="1" wrap="square" lIns="91425" tIns="91425" rIns="91425" bIns="91425" anchor="ctr" anchorCtr="0">
             <a:noAutofit/>
           </a:bodyPr>
           <a:lstStyle/>
           <a:p>
-            <a:pPr indent="0" lvl="0" marL="0" rtl="0" algn="l">
+            <a:pPr marL="0" lvl="0" indent="0" algn="l" rtl="0">
               <a:spcBef>
                 <a:spcPts val="0"/>
               </a:spcBef>
@@ -3616,9 +3774,6 @@
               </a:spcAft>
               <a:buNone/>
             </a:pPr>
-            <a:r>
-              <a:t/>
-            </a:r>
             <a:endParaRPr/>
           </a:p>
         </p:txBody>
@@ -3626,7 +3781,9 @@
       <p:sp>
         <p:nvSpPr>
           <p:cNvPr id="37" name="Google Shape;37;p9"/>
-          <p:cNvSpPr txBox="1"/>
+          <p:cNvSpPr txBox="1">
+            <a:spLocks noGrp="1"/>
+          </p:cNvSpPr>
           <p:nvPr>
             <p:ph type="title"/>
           </p:nvPr>
@@ -3641,7 +3798,7 @@
           </a:prstGeom>
         </p:spPr>
         <p:txBody>
-          <a:bodyPr anchorCtr="0" anchor="b" bIns="91425" lIns="91425" spcFirstLastPara="1" rIns="91425" wrap="square" tIns="91425"/>
+          <a:bodyPr spcFirstLastPara="1" wrap="square" lIns="91425" tIns="91425" rIns="91425" bIns="91425" anchor="b" anchorCtr="0"/>
           <a:lstStyle>
             <a:lvl1pPr lvl="0" algn="ctr">
               <a:spcBef>
@@ -3743,15 +3900,19 @@
               <a:defRPr sz="4200"/>
             </a:lvl9pPr>
           </a:lstStyle>
-          <a:p/>
+          <a:p>
+            <a:endParaRPr/>
+          </a:p>
         </p:txBody>
       </p:sp>
       <p:sp>
         <p:nvSpPr>
           <p:cNvPr id="38" name="Google Shape;38;p9"/>
-          <p:cNvSpPr txBox="1"/>
+          <p:cNvSpPr txBox="1">
+            <a:spLocks noGrp="1"/>
+          </p:cNvSpPr>
           <p:nvPr>
-            <p:ph idx="1" type="subTitle"/>
+            <p:ph type="subTitle" idx="1"/>
           </p:nvPr>
         </p:nvSpPr>
         <p:spPr>
@@ -3764,7 +3925,7 @@
           </a:prstGeom>
         </p:spPr>
         <p:txBody>
-          <a:bodyPr anchorCtr="0" anchor="t" bIns="91425" lIns="91425" spcFirstLastPara="1" rIns="91425" wrap="square" tIns="91425"/>
+          <a:bodyPr spcFirstLastPara="1" wrap="square" lIns="91425" tIns="91425" rIns="91425" bIns="91425" anchor="t" anchorCtr="0"/>
           <a:lstStyle>
             <a:lvl1pPr lvl="0" algn="ctr">
               <a:lnSpc>
@@ -3893,15 +4054,19 @@
               <a:defRPr sz="2100"/>
             </a:lvl9pPr>
           </a:lstStyle>
-          <a:p/>
+          <a:p>
+            <a:endParaRPr/>
+          </a:p>
         </p:txBody>
       </p:sp>
       <p:sp>
         <p:nvSpPr>
           <p:cNvPr id="39" name="Google Shape;39;p9"/>
-          <p:cNvSpPr txBox="1"/>
+          <p:cNvSpPr txBox="1">
+            <a:spLocks noGrp="1"/>
+          </p:cNvSpPr>
           <p:nvPr>
-            <p:ph idx="2" type="body"/>
+            <p:ph type="body" idx="2"/>
           </p:nvPr>
         </p:nvSpPr>
         <p:spPr>
@@ -3914,9 +4079,9 @@
           </a:prstGeom>
         </p:spPr>
         <p:txBody>
-          <a:bodyPr anchorCtr="0" anchor="ctr" bIns="91425" lIns="91425" spcFirstLastPara="1" rIns="91425" wrap="square" tIns="91425"/>
+          <a:bodyPr spcFirstLastPara="1" wrap="square" lIns="91425" tIns="91425" rIns="91425" bIns="91425" anchor="ctr" anchorCtr="0"/>
           <a:lstStyle>
-            <a:lvl1pPr indent="-342900" lvl="0" marL="457200">
+            <a:lvl1pPr marL="457200" lvl="0" indent="-342900">
               <a:spcBef>
                 <a:spcPts val="0"/>
               </a:spcBef>
@@ -3927,7 +4092,7 @@
               <a:buChar char="●"/>
               <a:defRPr/>
             </a:lvl1pPr>
-            <a:lvl2pPr indent="-317500" lvl="1" marL="914400">
+            <a:lvl2pPr marL="914400" lvl="1" indent="-317500">
               <a:spcBef>
                 <a:spcPts val="1600"/>
               </a:spcBef>
@@ -3938,7 +4103,7 @@
               <a:buChar char="○"/>
               <a:defRPr/>
             </a:lvl2pPr>
-            <a:lvl3pPr indent="-317500" lvl="2" marL="1371600">
+            <a:lvl3pPr marL="1371600" lvl="2" indent="-317500">
               <a:spcBef>
                 <a:spcPts val="1600"/>
               </a:spcBef>
@@ -3949,7 +4114,7 @@
               <a:buChar char="■"/>
               <a:defRPr/>
             </a:lvl3pPr>
-            <a:lvl4pPr indent="-317500" lvl="3" marL="1828800">
+            <a:lvl4pPr marL="1828800" lvl="3" indent="-317500">
               <a:spcBef>
                 <a:spcPts val="1600"/>
               </a:spcBef>
@@ -3960,7 +4125,7 @@
               <a:buChar char="●"/>
               <a:defRPr/>
             </a:lvl4pPr>
-            <a:lvl5pPr indent="-317500" lvl="4" marL="2286000">
+            <a:lvl5pPr marL="2286000" lvl="4" indent="-317500">
               <a:spcBef>
                 <a:spcPts val="1600"/>
               </a:spcBef>
@@ -3971,7 +4136,7 @@
               <a:buChar char="○"/>
               <a:defRPr/>
             </a:lvl5pPr>
-            <a:lvl6pPr indent="-317500" lvl="5" marL="2743200">
+            <a:lvl6pPr marL="2743200" lvl="5" indent="-317500">
               <a:spcBef>
                 <a:spcPts val="1600"/>
               </a:spcBef>
@@ -3982,7 +4147,7 @@
               <a:buChar char="■"/>
               <a:defRPr/>
             </a:lvl6pPr>
-            <a:lvl7pPr indent="-317500" lvl="6" marL="3200400">
+            <a:lvl7pPr marL="3200400" lvl="6" indent="-317500">
               <a:spcBef>
                 <a:spcPts val="1600"/>
               </a:spcBef>
@@ -3993,7 +4158,7 @@
               <a:buChar char="●"/>
               <a:defRPr/>
             </a:lvl7pPr>
-            <a:lvl8pPr indent="-317500" lvl="7" marL="3657600">
+            <a:lvl8pPr marL="3657600" lvl="7" indent="-317500">
               <a:spcBef>
                 <a:spcPts val="1600"/>
               </a:spcBef>
@@ -4004,7 +4169,7 @@
               <a:buChar char="○"/>
               <a:defRPr/>
             </a:lvl8pPr>
-            <a:lvl9pPr indent="-317500" lvl="8" marL="4114800">
+            <a:lvl9pPr marL="4114800" lvl="8" indent="-317500">
               <a:spcBef>
                 <a:spcPts val="1600"/>
               </a:spcBef>
@@ -4016,15 +4181,19 @@
               <a:defRPr/>
             </a:lvl9pPr>
           </a:lstStyle>
-          <a:p/>
+          <a:p>
+            <a:endParaRPr/>
+          </a:p>
         </p:txBody>
       </p:sp>
       <p:sp>
         <p:nvSpPr>
           <p:cNvPr id="40" name="Google Shape;40;p9"/>
-          <p:cNvSpPr txBox="1"/>
+          <p:cNvSpPr txBox="1">
+            <a:spLocks noGrp="1"/>
+          </p:cNvSpPr>
           <p:nvPr>
-            <p:ph idx="12" type="sldNum"/>
+            <p:ph type="sldNum" idx="12"/>
           </p:nvPr>
         </p:nvSpPr>
         <p:spPr>
@@ -4037,7 +4206,7 @@
           </a:prstGeom>
         </p:spPr>
         <p:txBody>
-          <a:bodyPr anchorCtr="0" anchor="ctr" bIns="91425" lIns="91425" spcFirstLastPara="1" rIns="91425" wrap="square" tIns="91425">
+          <a:bodyPr spcFirstLastPara="1" wrap="square" lIns="91425" tIns="91425" rIns="91425" bIns="91425" anchor="ctr" anchorCtr="0">
             <a:noAutofit/>
           </a:bodyPr>
           <a:lstStyle>
@@ -4079,7 +4248,7 @@
             </a:lvl9pPr>
           </a:lstStyle>
           <a:p>
-            <a:pPr indent="0" lvl="0" marL="0" rtl="0" algn="r">
+            <a:pPr marL="0" lvl="0" indent="0" algn="r" rtl="0">
               <a:spcBef>
                 <a:spcPts val="0"/>
               </a:spcBef>
@@ -4105,11 +4274,11 @@
 </file>
 
 <file path=ppt/slideLayouts/slideLayout9.xml><?xml version="1.0" encoding="utf-8"?>
-<p:sldLayout xmlns:a="http://schemas.openxmlformats.org/drawingml/2006/main" xmlns:r="http://schemas.openxmlformats.org/officeDocument/2006/relationships" xmlns:mc="http://schemas.openxmlformats.org/markup-compatibility/2006" xmlns:mv="urn:schemas-microsoft-com:mac:vml" xmlns:p="http://schemas.openxmlformats.org/presentationml/2006/main" xmlns:c="http://schemas.openxmlformats.org/drawingml/2006/chart" xmlns:dgm="http://schemas.openxmlformats.org/drawingml/2006/diagram" xmlns:o="urn:schemas-microsoft-com:office:office" xmlns:v="urn:schemas-microsoft-com:vml" xmlns:pvml="urn:schemas-microsoft-com:office:powerpoint" xmlns:com="http://schemas.openxmlformats.org/drawingml/2006/compatibility" xmlns:p14="http://schemas.microsoft.com/office/powerpoint/2010/main" xmlns:p15="http://schemas.microsoft.com/office/powerpoint/2012/main" matchingName="Caption">
+<p:sldLayout xmlns:a="http://schemas.openxmlformats.org/drawingml/2006/main" xmlns:r="http://schemas.openxmlformats.org/officeDocument/2006/relationships" xmlns:p="http://schemas.openxmlformats.org/presentationml/2006/main" matchingName="Caption">
   <p:cSld name="CAPTION_ONLY">
     <p:spTree>
       <p:nvGrpSpPr>
-        <p:cNvPr id="41" name="Shape 41"/>
+        <p:cNvPr id="1" name="Shape 41"/>
         <p:cNvGrpSpPr/>
         <p:nvPr/>
       </p:nvGrpSpPr>
@@ -4124,9 +4293,11 @@
       <p:sp>
         <p:nvSpPr>
           <p:cNvPr id="42" name="Google Shape;42;p10"/>
-          <p:cNvSpPr txBox="1"/>
+          <p:cNvSpPr txBox="1">
+            <a:spLocks noGrp="1"/>
+          </p:cNvSpPr>
           <p:nvPr>
-            <p:ph idx="1" type="body"/>
+            <p:ph type="body" idx="1"/>
           </p:nvPr>
         </p:nvSpPr>
         <p:spPr>
@@ -4139,9 +4310,9 @@
           </a:prstGeom>
         </p:spPr>
         <p:txBody>
-          <a:bodyPr anchorCtr="0" anchor="ctr" bIns="91425" lIns="91425" spcFirstLastPara="1" rIns="91425" wrap="square" tIns="91425"/>
+          <a:bodyPr spcFirstLastPara="1" wrap="square" lIns="91425" tIns="91425" rIns="91425" bIns="91425" anchor="ctr" anchorCtr="0"/>
           <a:lstStyle>
-            <a:lvl1pPr indent="-228600" lvl="0" marL="457200">
+            <a:lvl1pPr marL="457200" lvl="0" indent="-228600">
               <a:lnSpc>
                 <a:spcPct val="100000"/>
               </a:lnSpc>
@@ -4156,15 +4327,19 @@
               <a:defRPr/>
             </a:lvl1pPr>
           </a:lstStyle>
-          <a:p/>
+          <a:p>
+            <a:endParaRPr/>
+          </a:p>
         </p:txBody>
       </p:sp>
       <p:sp>
         <p:nvSpPr>
           <p:cNvPr id="43" name="Google Shape;43;p10"/>
-          <p:cNvSpPr txBox="1"/>
+          <p:cNvSpPr txBox="1">
+            <a:spLocks noGrp="1"/>
+          </p:cNvSpPr>
           <p:nvPr>
-            <p:ph idx="12" type="sldNum"/>
+            <p:ph type="sldNum" idx="12"/>
           </p:nvPr>
         </p:nvSpPr>
         <p:spPr>
@@ -4177,7 +4352,7 @@
           </a:prstGeom>
         </p:spPr>
         <p:txBody>
-          <a:bodyPr anchorCtr="0" anchor="ctr" bIns="91425" lIns="91425" spcFirstLastPara="1" rIns="91425" wrap="square" tIns="91425">
+          <a:bodyPr spcFirstLastPara="1" wrap="square" lIns="91425" tIns="91425" rIns="91425" bIns="91425" anchor="ctr" anchorCtr="0">
             <a:noAutofit/>
           </a:bodyPr>
           <a:lstStyle>
@@ -4219,7 +4394,7 @@
             </a:lvl9pPr>
           </a:lstStyle>
           <a:p>
-            <a:pPr indent="0" lvl="0" marL="0" rtl="0" algn="r">
+            <a:pPr marL="0" lvl="0" indent="0" algn="r" rtl="0">
               <a:spcBef>
                 <a:spcPts val="0"/>
               </a:spcBef>
@@ -4245,18 +4420,19 @@
 </file>
 
 <file path=ppt/slideMasters/slideMaster1.xml><?xml version="1.0" encoding="utf-8"?>
-<p:sldMaster xmlns:a="http://schemas.openxmlformats.org/drawingml/2006/main" xmlns:r="http://schemas.openxmlformats.org/officeDocument/2006/relationships" xmlns:mc="http://schemas.openxmlformats.org/markup-compatibility/2006" xmlns:mv="urn:schemas-microsoft-com:mac:vml" xmlns:p="http://schemas.openxmlformats.org/presentationml/2006/main" xmlns:c="http://schemas.openxmlformats.org/drawingml/2006/chart" xmlns:dgm="http://schemas.openxmlformats.org/drawingml/2006/diagram" xmlns:o="urn:schemas-microsoft-com:office:office" xmlns:v="urn:schemas-microsoft-com:vml" xmlns:pvml="urn:schemas-microsoft-com:office:powerpoint" xmlns:com="http://schemas.openxmlformats.org/drawingml/2006/compatibility" xmlns:p14="http://schemas.microsoft.com/office/powerpoint/2010/main" xmlns:p15="http://schemas.microsoft.com/office/powerpoint/2012/main">
+<p:sldMaster xmlns:a="http://schemas.openxmlformats.org/drawingml/2006/main" xmlns:r="http://schemas.openxmlformats.org/officeDocument/2006/relationships" xmlns:p="http://schemas.openxmlformats.org/presentationml/2006/main">
   <p:cSld name="simple-light-2">
     <p:bg>
       <p:bgPr>
         <a:solidFill>
           <a:schemeClr val="lt1"/>
         </a:solidFill>
+        <a:effectLst/>
       </p:bgPr>
     </p:bg>
     <p:spTree>
       <p:nvGrpSpPr>
-        <p:cNvPr id="5" name="Shape 5"/>
+        <p:cNvPr id="1" name="Shape 5"/>
         <p:cNvGrpSpPr/>
         <p:nvPr/>
       </p:nvGrpSpPr>
@@ -4271,7 +4447,9 @@
       <p:sp>
         <p:nvSpPr>
           <p:cNvPr id="6" name="Google Shape;6;p1"/>
-          <p:cNvSpPr txBox="1"/>
+          <p:cNvSpPr txBox="1">
+            <a:spLocks noGrp="1"/>
+          </p:cNvSpPr>
           <p:nvPr>
             <p:ph type="title"/>
           </p:nvPr>
@@ -4290,7 +4468,7 @@
           </a:ln>
         </p:spPr>
         <p:txBody>
-          <a:bodyPr anchorCtr="0" anchor="t" bIns="91425" lIns="91425" spcFirstLastPara="1" rIns="91425" wrap="square" tIns="91425"/>
+          <a:bodyPr spcFirstLastPara="1" wrap="square" lIns="91425" tIns="91425" rIns="91425" bIns="91425" anchor="t" anchorCtr="0"/>
           <a:lstStyle>
             <a:lvl1pPr lvl="0">
               <a:spcBef>
@@ -4455,15 +4633,19 @@
               </a:defRPr>
             </a:lvl9pPr>
           </a:lstStyle>
-          <a:p/>
+          <a:p>
+            <a:endParaRPr/>
+          </a:p>
         </p:txBody>
       </p:sp>
       <p:sp>
         <p:nvSpPr>
           <p:cNvPr id="7" name="Google Shape;7;p1"/>
-          <p:cNvSpPr txBox="1"/>
+          <p:cNvSpPr txBox="1">
+            <a:spLocks noGrp="1"/>
+          </p:cNvSpPr>
           <p:nvPr>
-            <p:ph idx="1" type="body"/>
+            <p:ph type="body" idx="1"/>
           </p:nvPr>
         </p:nvSpPr>
         <p:spPr>
@@ -4480,9 +4662,9 @@
           </a:ln>
         </p:spPr>
         <p:txBody>
-          <a:bodyPr anchorCtr="0" anchor="t" bIns="91425" lIns="91425" spcFirstLastPara="1" rIns="91425" wrap="square" tIns="91425"/>
+          <a:bodyPr spcFirstLastPara="1" wrap="square" lIns="91425" tIns="91425" rIns="91425" bIns="91425" anchor="t" anchorCtr="0"/>
           <a:lstStyle>
-            <a:lvl1pPr indent="-342900" lvl="0" marL="457200">
+            <a:lvl1pPr marL="457200" lvl="0" indent="-342900">
               <a:lnSpc>
                 <a:spcPct val="115000"/>
               </a:lnSpc>
@@ -4503,7 +4685,7 @@
                 </a:solidFill>
               </a:defRPr>
             </a:lvl1pPr>
-            <a:lvl2pPr indent="-317500" lvl="1" marL="914400">
+            <a:lvl2pPr marL="914400" lvl="1" indent="-317500">
               <a:lnSpc>
                 <a:spcPct val="115000"/>
               </a:lnSpc>
@@ -4524,7 +4706,7 @@
                 </a:solidFill>
               </a:defRPr>
             </a:lvl2pPr>
-            <a:lvl3pPr indent="-317500" lvl="2" marL="1371600">
+            <a:lvl3pPr marL="1371600" lvl="2" indent="-317500">
               <a:lnSpc>
                 <a:spcPct val="115000"/>
               </a:lnSpc>
@@ -4545,7 +4727,7 @@
                 </a:solidFill>
               </a:defRPr>
             </a:lvl3pPr>
-            <a:lvl4pPr indent="-317500" lvl="3" marL="1828800">
+            <a:lvl4pPr marL="1828800" lvl="3" indent="-317500">
               <a:lnSpc>
                 <a:spcPct val="115000"/>
               </a:lnSpc>
@@ -4566,7 +4748,7 @@
                 </a:solidFill>
               </a:defRPr>
             </a:lvl4pPr>
-            <a:lvl5pPr indent="-317500" lvl="4" marL="2286000">
+            <a:lvl5pPr marL="2286000" lvl="4" indent="-317500">
               <a:lnSpc>
                 <a:spcPct val="115000"/>
               </a:lnSpc>
@@ -4587,7 +4769,7 @@
                 </a:solidFill>
               </a:defRPr>
             </a:lvl5pPr>
-            <a:lvl6pPr indent="-317500" lvl="5" marL="2743200">
+            <a:lvl6pPr marL="2743200" lvl="5" indent="-317500">
               <a:lnSpc>
                 <a:spcPct val="115000"/>
               </a:lnSpc>
@@ -4608,7 +4790,7 @@
                 </a:solidFill>
               </a:defRPr>
             </a:lvl6pPr>
-            <a:lvl7pPr indent="-317500" lvl="6" marL="3200400">
+            <a:lvl7pPr marL="3200400" lvl="6" indent="-317500">
               <a:lnSpc>
                 <a:spcPct val="115000"/>
               </a:lnSpc>
@@ -4629,7 +4811,7 @@
                 </a:solidFill>
               </a:defRPr>
             </a:lvl7pPr>
-            <a:lvl8pPr indent="-317500" lvl="7" marL="3657600">
+            <a:lvl8pPr marL="3657600" lvl="7" indent="-317500">
               <a:lnSpc>
                 <a:spcPct val="115000"/>
               </a:lnSpc>
@@ -4650,7 +4832,7 @@
                 </a:solidFill>
               </a:defRPr>
             </a:lvl8pPr>
-            <a:lvl9pPr indent="-317500" lvl="8" marL="4114800">
+            <a:lvl9pPr marL="4114800" lvl="8" indent="-317500">
               <a:lnSpc>
                 <a:spcPct val="115000"/>
               </a:lnSpc>
@@ -4672,15 +4854,19 @@
               </a:defRPr>
             </a:lvl9pPr>
           </a:lstStyle>
-          <a:p/>
+          <a:p>
+            <a:endParaRPr/>
+          </a:p>
         </p:txBody>
       </p:sp>
       <p:sp>
         <p:nvSpPr>
           <p:cNvPr id="8" name="Google Shape;8;p1"/>
-          <p:cNvSpPr txBox="1"/>
+          <p:cNvSpPr txBox="1">
+            <a:spLocks noGrp="1"/>
+          </p:cNvSpPr>
           <p:nvPr>
-            <p:ph idx="12" type="sldNum"/>
+            <p:ph type="sldNum" idx="12"/>
           </p:nvPr>
         </p:nvSpPr>
         <p:spPr>
@@ -4697,7 +4883,7 @@
           </a:ln>
         </p:spPr>
         <p:txBody>
-          <a:bodyPr anchorCtr="0" anchor="ctr" bIns="91425" lIns="91425" spcFirstLastPara="1" rIns="91425" wrap="square" tIns="91425">
+          <a:bodyPr spcFirstLastPara="1" wrap="square" lIns="91425" tIns="91425" rIns="91425" bIns="91425" anchor="ctr" anchorCtr="0">
             <a:noAutofit/>
           </a:bodyPr>
           <a:lstStyle>
@@ -4775,7 +4961,7 @@
             </a:lvl9pPr>
           </a:lstStyle>
           <a:p>
-            <a:pPr indent="0" lvl="0" marL="0" rtl="0" algn="r">
+            <a:pPr marL="0" lvl="0" indent="0" algn="r" rtl="0">
               <a:spcBef>
                 <a:spcPts val="0"/>
               </a:spcBef>
@@ -4794,7 +4980,7 @@
       </p:sp>
     </p:spTree>
   </p:cSld>
-  <p:clrMap accent1="accent1" accent2="accent2" accent3="accent3" accent4="accent4" accent5="accent5" accent6="accent6" bg1="lt1" bg2="dk2" tx1="dk1" tx2="lt2" folHlink="folHlink" hlink="hlink"/>
+  <p:clrMap bg1="lt1" tx1="dk1" bg2="dk2" tx2="lt2" accent1="accent1" accent2="accent2" accent3="accent3" accent4="accent4" accent5="accent5" accent6="accent6" hlink="hlink" folHlink="folHlink"/>
   <p:sldLayoutIdLst>
     <p:sldLayoutId id="2147483648" r:id="rId1"/>
     <p:sldLayoutId id="2147483649" r:id="rId2"/>
@@ -4808,10 +4994,10 @@
     <p:sldLayoutId id="2147483657" r:id="rId10"/>
     <p:sldLayoutId id="2147483658" r:id="rId11"/>
   </p:sldLayoutIdLst>
-  <p:hf dt="0" ftr="0" hdr="0" sldNum="0"/>
+  <p:hf sldNum="0" hdr="0" ftr="0" dt="0"/>
   <p:txStyles>
     <p:titleStyle>
-      <a:defPPr lvl="0" marR="0" rtl="0" algn="l">
+      <a:defPPr marR="0" lvl="0" algn="l" rtl="0">
         <a:lnSpc>
           <a:spcPct val="100000"/>
         </a:lnSpc>
@@ -4822,7 +5008,7 @@
           <a:spcPts val="0"/>
         </a:spcAft>
       </a:defPPr>
-      <a:lvl1pPr lvl="0" marR="0" rtl="0" algn="l">
+      <a:lvl1pPr marR="0" lvl="0" algn="l" rtl="0">
         <a:lnSpc>
           <a:spcPct val="100000"/>
         </a:lnSpc>
@@ -4836,7 +5022,7 @@
           <a:srgbClr val="000000"/>
         </a:buClr>
         <a:buFont typeface="Arial"/>
-        <a:defRPr b="0" i="0" sz="1400" u="none" cap="none" strike="noStrike">
+        <a:defRPr sz="1400" b="0" i="0" u="none" strike="noStrike" cap="none">
           <a:solidFill>
             <a:srgbClr val="000000"/>
           </a:solidFill>
@@ -4846,7 +5032,7 @@
           <a:sym typeface="Arial"/>
         </a:defRPr>
       </a:lvl1pPr>
-      <a:lvl2pPr lvl="1" marR="0" rtl="0" algn="l">
+      <a:lvl2pPr marR="0" lvl="1" algn="l" rtl="0">
         <a:lnSpc>
           <a:spcPct val="100000"/>
         </a:lnSpc>
@@ -4860,7 +5046,7 @@
           <a:srgbClr val="000000"/>
         </a:buClr>
         <a:buFont typeface="Arial"/>
-        <a:defRPr b="0" i="0" sz="1400" u="none" cap="none" strike="noStrike">
+        <a:defRPr sz="1400" b="0" i="0" u="none" strike="noStrike" cap="none">
           <a:solidFill>
             <a:srgbClr val="000000"/>
           </a:solidFill>
@@ -4870,7 +5056,7 @@
           <a:sym typeface="Arial"/>
         </a:defRPr>
       </a:lvl2pPr>
-      <a:lvl3pPr lvl="2" marR="0" rtl="0" algn="l">
+      <a:lvl3pPr marR="0" lvl="2" algn="l" rtl="0">
         <a:lnSpc>
           <a:spcPct val="100000"/>
         </a:lnSpc>
@@ -4884,7 +5070,7 @@
           <a:srgbClr val="000000"/>
         </a:buClr>
         <a:buFont typeface="Arial"/>
-        <a:defRPr b="0" i="0" sz="1400" u="none" cap="none" strike="noStrike">
+        <a:defRPr sz="1400" b="0" i="0" u="none" strike="noStrike" cap="none">
           <a:solidFill>
             <a:srgbClr val="000000"/>
           </a:solidFill>
@@ -4894,7 +5080,7 @@
           <a:sym typeface="Arial"/>
         </a:defRPr>
       </a:lvl3pPr>
-      <a:lvl4pPr lvl="3" marR="0" rtl="0" algn="l">
+      <a:lvl4pPr marR="0" lvl="3" algn="l" rtl="0">
         <a:lnSpc>
           <a:spcPct val="100000"/>
         </a:lnSpc>
@@ -4908,7 +5094,7 @@
           <a:srgbClr val="000000"/>
         </a:buClr>
         <a:buFont typeface="Arial"/>
-        <a:defRPr b="0" i="0" sz="1400" u="none" cap="none" strike="noStrike">
+        <a:defRPr sz="1400" b="0" i="0" u="none" strike="noStrike" cap="none">
           <a:solidFill>
             <a:srgbClr val="000000"/>
           </a:solidFill>
@@ -4918,7 +5104,7 @@
           <a:sym typeface="Arial"/>
         </a:defRPr>
       </a:lvl4pPr>
-      <a:lvl5pPr lvl="4" marR="0" rtl="0" algn="l">
+      <a:lvl5pPr marR="0" lvl="4" algn="l" rtl="0">
         <a:lnSpc>
           <a:spcPct val="100000"/>
         </a:lnSpc>
@@ -4932,7 +5118,7 @@
           <a:srgbClr val="000000"/>
         </a:buClr>
         <a:buFont typeface="Arial"/>
-        <a:defRPr b="0" i="0" sz="1400" u="none" cap="none" strike="noStrike">
+        <a:defRPr sz="1400" b="0" i="0" u="none" strike="noStrike" cap="none">
           <a:solidFill>
             <a:srgbClr val="000000"/>
           </a:solidFill>
@@ -4942,7 +5128,7 @@
           <a:sym typeface="Arial"/>
         </a:defRPr>
       </a:lvl5pPr>
-      <a:lvl6pPr lvl="5" marR="0" rtl="0" algn="l">
+      <a:lvl6pPr marR="0" lvl="5" algn="l" rtl="0">
         <a:lnSpc>
           <a:spcPct val="100000"/>
         </a:lnSpc>
@@ -4956,7 +5142,7 @@
           <a:srgbClr val="000000"/>
         </a:buClr>
         <a:buFont typeface="Arial"/>
-        <a:defRPr b="0" i="0" sz="1400" u="none" cap="none" strike="noStrike">
+        <a:defRPr sz="1400" b="0" i="0" u="none" strike="noStrike" cap="none">
           <a:solidFill>
             <a:srgbClr val="000000"/>
           </a:solidFill>
@@ -4966,7 +5152,7 @@
           <a:sym typeface="Arial"/>
         </a:defRPr>
       </a:lvl6pPr>
-      <a:lvl7pPr lvl="6" marR="0" rtl="0" algn="l">
+      <a:lvl7pPr marR="0" lvl="6" algn="l" rtl="0">
         <a:lnSpc>
           <a:spcPct val="100000"/>
         </a:lnSpc>
@@ -4980,7 +5166,7 @@
           <a:srgbClr val="000000"/>
         </a:buClr>
         <a:buFont typeface="Arial"/>
-        <a:defRPr b="0" i="0" sz="1400" u="none" cap="none" strike="noStrike">
+        <a:defRPr sz="1400" b="0" i="0" u="none" strike="noStrike" cap="none">
           <a:solidFill>
             <a:srgbClr val="000000"/>
           </a:solidFill>
@@ -4990,7 +5176,7 @@
           <a:sym typeface="Arial"/>
         </a:defRPr>
       </a:lvl7pPr>
-      <a:lvl8pPr lvl="7" marR="0" rtl="0" algn="l">
+      <a:lvl8pPr marR="0" lvl="7" algn="l" rtl="0">
         <a:lnSpc>
           <a:spcPct val="100000"/>
         </a:lnSpc>
@@ -5004,7 +5190,7 @@
           <a:srgbClr val="000000"/>
         </a:buClr>
         <a:buFont typeface="Arial"/>
-        <a:defRPr b="0" i="0" sz="1400" u="none" cap="none" strike="noStrike">
+        <a:defRPr sz="1400" b="0" i="0" u="none" strike="noStrike" cap="none">
           <a:solidFill>
             <a:srgbClr val="000000"/>
           </a:solidFill>
@@ -5014,7 +5200,7 @@
           <a:sym typeface="Arial"/>
         </a:defRPr>
       </a:lvl8pPr>
-      <a:lvl9pPr lvl="8" marR="0" rtl="0" algn="l">
+      <a:lvl9pPr marR="0" lvl="8" algn="l" rtl="0">
         <a:lnSpc>
           <a:spcPct val="100000"/>
         </a:lnSpc>
@@ -5028,7 +5214,7 @@
           <a:srgbClr val="000000"/>
         </a:buClr>
         <a:buFont typeface="Arial"/>
-        <a:defRPr b="0" i="0" sz="1400" u="none" cap="none" strike="noStrike">
+        <a:defRPr sz="1400" b="0" i="0" u="none" strike="noStrike" cap="none">
           <a:solidFill>
             <a:srgbClr val="000000"/>
           </a:solidFill>
@@ -5040,7 +5226,7 @@
       </a:lvl9pPr>
     </p:titleStyle>
     <p:bodyStyle>
-      <a:defPPr lvl="0" marR="0" rtl="0" algn="l">
+      <a:defPPr marR="0" lvl="0" algn="l" rtl="0">
         <a:lnSpc>
           <a:spcPct val="100000"/>
         </a:lnSpc>
@@ -5051,7 +5237,7 @@
           <a:spcPts val="0"/>
         </a:spcAft>
       </a:defPPr>
-      <a:lvl1pPr lvl="0" marR="0" rtl="0" algn="l">
+      <a:lvl1pPr marR="0" lvl="0" algn="l" rtl="0">
         <a:lnSpc>
           <a:spcPct val="100000"/>
         </a:lnSpc>
@@ -5065,7 +5251,7 @@
           <a:srgbClr val="000000"/>
         </a:buClr>
         <a:buFont typeface="Arial"/>
-        <a:defRPr b="0" i="0" sz="1400" u="none" cap="none" strike="noStrike">
+        <a:defRPr sz="1400" b="0" i="0" u="none" strike="noStrike" cap="none">
           <a:solidFill>
             <a:srgbClr val="000000"/>
           </a:solidFill>
@@ -5075,7 +5261,7 @@
           <a:sym typeface="Arial"/>
         </a:defRPr>
       </a:lvl1pPr>
-      <a:lvl2pPr lvl="1" marR="0" rtl="0" algn="l">
+      <a:lvl2pPr marR="0" lvl="1" algn="l" rtl="0">
         <a:lnSpc>
           <a:spcPct val="100000"/>
         </a:lnSpc>
@@ -5089,7 +5275,7 @@
           <a:srgbClr val="000000"/>
         </a:buClr>
         <a:buFont typeface="Arial"/>
-        <a:defRPr b="0" i="0" sz="1400" u="none" cap="none" strike="noStrike">
+        <a:defRPr sz="1400" b="0" i="0" u="none" strike="noStrike" cap="none">
           <a:solidFill>
             <a:srgbClr val="000000"/>
           </a:solidFill>
@@ -5099,7 +5285,7 @@
           <a:sym typeface="Arial"/>
         </a:defRPr>
       </a:lvl2pPr>
-      <a:lvl3pPr lvl="2" marR="0" rtl="0" algn="l">
+      <a:lvl3pPr marR="0" lvl="2" algn="l" rtl="0">
         <a:lnSpc>
           <a:spcPct val="100000"/>
         </a:lnSpc>
@@ -5113,7 +5299,7 @@
           <a:srgbClr val="000000"/>
         </a:buClr>
         <a:buFont typeface="Arial"/>
-        <a:defRPr b="0" i="0" sz="1400" u="none" cap="none" strike="noStrike">
+        <a:defRPr sz="1400" b="0" i="0" u="none" strike="noStrike" cap="none">
           <a:solidFill>
             <a:srgbClr val="000000"/>
           </a:solidFill>
@@ -5123,7 +5309,7 @@
           <a:sym typeface="Arial"/>
         </a:defRPr>
       </a:lvl3pPr>
-      <a:lvl4pPr lvl="3" marR="0" rtl="0" algn="l">
+      <a:lvl4pPr marR="0" lvl="3" algn="l" rtl="0">
         <a:lnSpc>
           <a:spcPct val="100000"/>
         </a:lnSpc>
@@ -5137,7 +5323,7 @@
           <a:srgbClr val="000000"/>
         </a:buClr>
         <a:buFont typeface="Arial"/>
-        <a:defRPr b="0" i="0" sz="1400" u="none" cap="none" strike="noStrike">
+        <a:defRPr sz="1400" b="0" i="0" u="none" strike="noStrike" cap="none">
           <a:solidFill>
             <a:srgbClr val="000000"/>
           </a:solidFill>
@@ -5147,7 +5333,7 @@
           <a:sym typeface="Arial"/>
         </a:defRPr>
       </a:lvl4pPr>
-      <a:lvl5pPr lvl="4" marR="0" rtl="0" algn="l">
+      <a:lvl5pPr marR="0" lvl="4" algn="l" rtl="0">
         <a:lnSpc>
           <a:spcPct val="100000"/>
         </a:lnSpc>
@@ -5161,7 +5347,7 @@
           <a:srgbClr val="000000"/>
         </a:buClr>
         <a:buFont typeface="Arial"/>
-        <a:defRPr b="0" i="0" sz="1400" u="none" cap="none" strike="noStrike">
+        <a:defRPr sz="1400" b="0" i="0" u="none" strike="noStrike" cap="none">
           <a:solidFill>
             <a:srgbClr val="000000"/>
           </a:solidFill>
@@ -5171,7 +5357,7 @@
           <a:sym typeface="Arial"/>
         </a:defRPr>
       </a:lvl5pPr>
-      <a:lvl6pPr lvl="5" marR="0" rtl="0" algn="l">
+      <a:lvl6pPr marR="0" lvl="5" algn="l" rtl="0">
         <a:lnSpc>
           <a:spcPct val="100000"/>
         </a:lnSpc>
@@ -5185,7 +5371,7 @@
           <a:srgbClr val="000000"/>
         </a:buClr>
         <a:buFont typeface="Arial"/>
-        <a:defRPr b="0" i="0" sz="1400" u="none" cap="none" strike="noStrike">
+        <a:defRPr sz="1400" b="0" i="0" u="none" strike="noStrike" cap="none">
           <a:solidFill>
             <a:srgbClr val="000000"/>
           </a:solidFill>
@@ -5195,7 +5381,7 @@
           <a:sym typeface="Arial"/>
         </a:defRPr>
       </a:lvl6pPr>
-      <a:lvl7pPr lvl="6" marR="0" rtl="0" algn="l">
+      <a:lvl7pPr marR="0" lvl="6" algn="l" rtl="0">
         <a:lnSpc>
           <a:spcPct val="100000"/>
         </a:lnSpc>
@@ -5209,7 +5395,7 @@
           <a:srgbClr val="000000"/>
         </a:buClr>
         <a:buFont typeface="Arial"/>
-        <a:defRPr b="0" i="0" sz="1400" u="none" cap="none" strike="noStrike">
+        <a:defRPr sz="1400" b="0" i="0" u="none" strike="noStrike" cap="none">
           <a:solidFill>
             <a:srgbClr val="000000"/>
           </a:solidFill>
@@ -5219,7 +5405,7 @@
           <a:sym typeface="Arial"/>
         </a:defRPr>
       </a:lvl7pPr>
-      <a:lvl8pPr lvl="7" marR="0" rtl="0" algn="l">
+      <a:lvl8pPr marR="0" lvl="7" algn="l" rtl="0">
         <a:lnSpc>
           <a:spcPct val="100000"/>
         </a:lnSpc>
@@ -5233,7 +5419,7 @@
           <a:srgbClr val="000000"/>
         </a:buClr>
         <a:buFont typeface="Arial"/>
-        <a:defRPr b="0" i="0" sz="1400" u="none" cap="none" strike="noStrike">
+        <a:defRPr sz="1400" b="0" i="0" u="none" strike="noStrike" cap="none">
           <a:solidFill>
             <a:srgbClr val="000000"/>
           </a:solidFill>
@@ -5243,7 +5429,7 @@
           <a:sym typeface="Arial"/>
         </a:defRPr>
       </a:lvl8pPr>
-      <a:lvl9pPr lvl="8" marR="0" rtl="0" algn="l">
+      <a:lvl9pPr marR="0" lvl="8" algn="l" rtl="0">
         <a:lnSpc>
           <a:spcPct val="100000"/>
         </a:lnSpc>
@@ -5257,7 +5443,7 @@
           <a:srgbClr val="000000"/>
         </a:buClr>
         <a:buFont typeface="Arial"/>
-        <a:defRPr b="0" i="0" sz="1400" u="none" cap="none" strike="noStrike">
+        <a:defRPr sz="1400" b="0" i="0" u="none" strike="noStrike" cap="none">
           <a:solidFill>
             <a:srgbClr val="000000"/>
           </a:solidFill>
@@ -5269,7 +5455,7 @@
       </a:lvl9pPr>
     </p:bodyStyle>
     <p:otherStyle>
-      <a:defPPr lvl="0" marR="0" rtl="0" algn="l">
+      <a:defPPr marR="0" lvl="0" algn="l" rtl="0">
         <a:lnSpc>
           <a:spcPct val="100000"/>
         </a:lnSpc>
@@ -5280,7 +5466,7 @@
           <a:spcPts val="0"/>
         </a:spcAft>
       </a:defPPr>
-      <a:lvl1pPr lvl="0" marR="0" rtl="0" algn="l">
+      <a:lvl1pPr marR="0" lvl="0" algn="l" rtl="0">
         <a:lnSpc>
           <a:spcPct val="100000"/>
         </a:lnSpc>
@@ -5294,7 +5480,7 @@
           <a:srgbClr val="000000"/>
         </a:buClr>
         <a:buFont typeface="Arial"/>
-        <a:defRPr b="0" i="0" sz="1400" u="none" cap="none" strike="noStrike">
+        <a:defRPr sz="1400" b="0" i="0" u="none" strike="noStrike" cap="none">
           <a:solidFill>
             <a:srgbClr val="000000"/>
           </a:solidFill>
@@ -5304,7 +5490,7 @@
           <a:sym typeface="Arial"/>
         </a:defRPr>
       </a:lvl1pPr>
-      <a:lvl2pPr lvl="1" marR="0" rtl="0" algn="l">
+      <a:lvl2pPr marR="0" lvl="1" algn="l" rtl="0">
         <a:lnSpc>
           <a:spcPct val="100000"/>
         </a:lnSpc>
@@ -5318,7 +5504,7 @@
           <a:srgbClr val="000000"/>
         </a:buClr>
         <a:buFont typeface="Arial"/>
-        <a:defRPr b="0" i="0" sz="1400" u="none" cap="none" strike="noStrike">
+        <a:defRPr sz="1400" b="0" i="0" u="none" strike="noStrike" cap="none">
           <a:solidFill>
             <a:srgbClr val="000000"/>
           </a:solidFill>
@@ -5328,7 +5514,7 @@
           <a:sym typeface="Arial"/>
         </a:defRPr>
       </a:lvl2pPr>
-      <a:lvl3pPr lvl="2" marR="0" rtl="0" algn="l">
+      <a:lvl3pPr marR="0" lvl="2" algn="l" rtl="0">
         <a:lnSpc>
           <a:spcPct val="100000"/>
         </a:lnSpc>
@@ -5342,7 +5528,7 @@
           <a:srgbClr val="000000"/>
         </a:buClr>
         <a:buFont typeface="Arial"/>
-        <a:defRPr b="0" i="0" sz="1400" u="none" cap="none" strike="noStrike">
+        <a:defRPr sz="1400" b="0" i="0" u="none" strike="noStrike" cap="none">
           <a:solidFill>
             <a:srgbClr val="000000"/>
           </a:solidFill>
@@ -5352,7 +5538,7 @@
           <a:sym typeface="Arial"/>
         </a:defRPr>
       </a:lvl3pPr>
-      <a:lvl4pPr lvl="3" marR="0" rtl="0" algn="l">
+      <a:lvl4pPr marR="0" lvl="3" algn="l" rtl="0">
         <a:lnSpc>
           <a:spcPct val="100000"/>
         </a:lnSpc>
@@ -5366,7 +5552,7 @@
           <a:srgbClr val="000000"/>
         </a:buClr>
         <a:buFont typeface="Arial"/>
-        <a:defRPr b="0" i="0" sz="1400" u="none" cap="none" strike="noStrike">
+        <a:defRPr sz="1400" b="0" i="0" u="none" strike="noStrike" cap="none">
           <a:solidFill>
             <a:srgbClr val="000000"/>
           </a:solidFill>
@@ -5376,7 +5562,7 @@
           <a:sym typeface="Arial"/>
         </a:defRPr>
       </a:lvl4pPr>
-      <a:lvl5pPr lvl="4" marR="0" rtl="0" algn="l">
+      <a:lvl5pPr marR="0" lvl="4" algn="l" rtl="0">
         <a:lnSpc>
           <a:spcPct val="100000"/>
         </a:lnSpc>
@@ -5390,7 +5576,7 @@
           <a:srgbClr val="000000"/>
         </a:buClr>
         <a:buFont typeface="Arial"/>
-        <a:defRPr b="0" i="0" sz="1400" u="none" cap="none" strike="noStrike">
+        <a:defRPr sz="1400" b="0" i="0" u="none" strike="noStrike" cap="none">
           <a:solidFill>
             <a:srgbClr val="000000"/>
           </a:solidFill>
@@ -5400,7 +5586,7 @@
           <a:sym typeface="Arial"/>
         </a:defRPr>
       </a:lvl5pPr>
-      <a:lvl6pPr lvl="5" marR="0" rtl="0" algn="l">
+      <a:lvl6pPr marR="0" lvl="5" algn="l" rtl="0">
         <a:lnSpc>
           <a:spcPct val="100000"/>
         </a:lnSpc>
@@ -5414,7 +5600,7 @@
           <a:srgbClr val="000000"/>
         </a:buClr>
         <a:buFont typeface="Arial"/>
-        <a:defRPr b="0" i="0" sz="1400" u="none" cap="none" strike="noStrike">
+        <a:defRPr sz="1400" b="0" i="0" u="none" strike="noStrike" cap="none">
           <a:solidFill>
             <a:srgbClr val="000000"/>
           </a:solidFill>
@@ -5424,7 +5610,7 @@
           <a:sym typeface="Arial"/>
         </a:defRPr>
       </a:lvl6pPr>
-      <a:lvl7pPr lvl="6" marR="0" rtl="0" algn="l">
+      <a:lvl7pPr marR="0" lvl="6" algn="l" rtl="0">
         <a:lnSpc>
           <a:spcPct val="100000"/>
         </a:lnSpc>
@@ -5438,7 +5624,7 @@
           <a:srgbClr val="000000"/>
         </a:buClr>
         <a:buFont typeface="Arial"/>
-        <a:defRPr b="0" i="0" sz="1400" u="none" cap="none" strike="noStrike">
+        <a:defRPr sz="1400" b="0" i="0" u="none" strike="noStrike" cap="none">
           <a:solidFill>
             <a:srgbClr val="000000"/>
           </a:solidFill>
@@ -5448,7 +5634,7 @@
           <a:sym typeface="Arial"/>
         </a:defRPr>
       </a:lvl7pPr>
-      <a:lvl8pPr lvl="7" marR="0" rtl="0" algn="l">
+      <a:lvl8pPr marR="0" lvl="7" algn="l" rtl="0">
         <a:lnSpc>
           <a:spcPct val="100000"/>
         </a:lnSpc>
@@ -5462,7 +5648,7 @@
           <a:srgbClr val="000000"/>
         </a:buClr>
         <a:buFont typeface="Arial"/>
-        <a:defRPr b="0" i="0" sz="1400" u="none" cap="none" strike="noStrike">
+        <a:defRPr sz="1400" b="0" i="0" u="none" strike="noStrike" cap="none">
           <a:solidFill>
             <a:srgbClr val="000000"/>
           </a:solidFill>
@@ -5472,7 +5658,7 @@
           <a:sym typeface="Arial"/>
         </a:defRPr>
       </a:lvl8pPr>
-      <a:lvl9pPr lvl="8" marR="0" rtl="0" algn="l">
+      <a:lvl9pPr marR="0" lvl="8" algn="l" rtl="0">
         <a:lnSpc>
           <a:spcPct val="100000"/>
         </a:lnSpc>
@@ -5486,7 +5672,7 @@
           <a:srgbClr val="000000"/>
         </a:buClr>
         <a:buFont typeface="Arial"/>
-        <a:defRPr b="0" i="0" sz="1400" u="none" cap="none" strike="noStrike">
+        <a:defRPr sz="1400" b="0" i="0" u="none" strike="noStrike" cap="none">
           <a:solidFill>
             <a:srgbClr val="000000"/>
           </a:solidFill>
@@ -5502,11 +5688,11 @@
 </file>
 
 <file path=ppt/slides/slide1.xml><?xml version="1.0" encoding="utf-8"?>
-<p:sld xmlns:a="http://schemas.openxmlformats.org/drawingml/2006/main" xmlns:r="http://schemas.openxmlformats.org/officeDocument/2006/relationships" xmlns:mc="http://schemas.openxmlformats.org/markup-compatibility/2006" xmlns:mv="urn:schemas-microsoft-com:mac:vml" xmlns:p="http://schemas.openxmlformats.org/presentationml/2006/main" xmlns:c="http://schemas.openxmlformats.org/drawingml/2006/chart" xmlns:dgm="http://schemas.openxmlformats.org/drawingml/2006/diagram" xmlns:o="urn:schemas-microsoft-com:office:office" xmlns:v="urn:schemas-microsoft-com:vml" xmlns:pvml="urn:schemas-microsoft-com:office:powerpoint" xmlns:com="http://schemas.openxmlformats.org/drawingml/2006/compatibility" xmlns:p14="http://schemas.microsoft.com/office/powerpoint/2010/main" xmlns:p15="http://schemas.microsoft.com/office/powerpoint/2012/main">
+<p:sld xmlns:a="http://schemas.openxmlformats.org/drawingml/2006/main" xmlns:r="http://schemas.openxmlformats.org/officeDocument/2006/relationships" xmlns:p="http://schemas.openxmlformats.org/presentationml/2006/main">
   <p:cSld>
     <p:spTree>
       <p:nvGrpSpPr>
-        <p:cNvPr id="53" name="Shape 53"/>
+        <p:cNvPr id="1" name="Shape 53"/>
         <p:cNvGrpSpPr/>
         <p:nvPr/>
       </p:nvGrpSpPr>
@@ -5521,7 +5707,9 @@
       <p:sp>
         <p:nvSpPr>
           <p:cNvPr id="54" name="Google Shape;54;p13"/>
-          <p:cNvSpPr txBox="1"/>
+          <p:cNvSpPr txBox="1">
+            <a:spLocks noGrp="1"/>
+          </p:cNvSpPr>
           <p:nvPr>
             <p:ph type="ctrTitle"/>
           </p:nvPr>
@@ -5536,12 +5724,12 @@
           </a:prstGeom>
         </p:spPr>
         <p:txBody>
-          <a:bodyPr anchorCtr="0" anchor="b" bIns="91425" lIns="91425" spcFirstLastPara="1" rIns="91425" wrap="square" tIns="91425">
+          <a:bodyPr spcFirstLastPara="1" wrap="square" lIns="91425" tIns="91425" rIns="91425" bIns="91425" anchor="b" anchorCtr="0">
             <a:noAutofit/>
           </a:bodyPr>
           <a:lstStyle/>
           <a:p>
-            <a:pPr indent="0" lvl="0" marL="0" rtl="0" algn="ctr">
+            <a:pPr marL="0" lvl="0" indent="0" algn="ctr" rtl="0">
               <a:spcBef>
                 <a:spcPts val="0"/>
               </a:spcBef>
@@ -5561,9 +5749,11 @@
       <p:sp>
         <p:nvSpPr>
           <p:cNvPr id="55" name="Google Shape;55;p13"/>
-          <p:cNvSpPr txBox="1"/>
+          <p:cNvSpPr txBox="1">
+            <a:spLocks noGrp="1"/>
+          </p:cNvSpPr>
           <p:nvPr>
-            <p:ph idx="1" type="subTitle"/>
+            <p:ph type="subTitle" idx="1"/>
           </p:nvPr>
         </p:nvSpPr>
         <p:spPr>
@@ -5576,12 +5766,12 @@
           </a:prstGeom>
         </p:spPr>
         <p:txBody>
-          <a:bodyPr anchorCtr="0" anchor="t" bIns="91425" lIns="91425" spcFirstLastPara="1" rIns="91425" wrap="square" tIns="91425">
+          <a:bodyPr spcFirstLastPara="1" wrap="square" lIns="91425" tIns="91425" rIns="91425" bIns="91425" anchor="t" anchorCtr="0">
             <a:noAutofit/>
           </a:bodyPr>
           <a:lstStyle/>
           <a:p>
-            <a:pPr indent="0" lvl="0" marL="0" rtl="0" algn="ctr">
+            <a:pPr marL="0" lvl="0" indent="0" algn="ctr" rtl="0">
               <a:spcBef>
                 <a:spcPts val="0"/>
               </a:spcBef>
@@ -5607,11 +5797,11 @@
 </file>
 
 <file path=ppt/slides/slide2.xml><?xml version="1.0" encoding="utf-8"?>
-<p:sld xmlns:a="http://schemas.openxmlformats.org/drawingml/2006/main" xmlns:r="http://schemas.openxmlformats.org/officeDocument/2006/relationships" xmlns:mc="http://schemas.openxmlformats.org/markup-compatibility/2006" xmlns:mv="urn:schemas-microsoft-com:mac:vml" xmlns:p="http://schemas.openxmlformats.org/presentationml/2006/main" xmlns:c="http://schemas.openxmlformats.org/drawingml/2006/chart" xmlns:dgm="http://schemas.openxmlformats.org/drawingml/2006/diagram" xmlns:o="urn:schemas-microsoft-com:office:office" xmlns:v="urn:schemas-microsoft-com:vml" xmlns:pvml="urn:schemas-microsoft-com:office:powerpoint" xmlns:com="http://schemas.openxmlformats.org/drawingml/2006/compatibility" xmlns:p14="http://schemas.microsoft.com/office/powerpoint/2010/main" xmlns:p15="http://schemas.microsoft.com/office/powerpoint/2012/main">
+<p:sld xmlns:a="http://schemas.openxmlformats.org/drawingml/2006/main" xmlns:r="http://schemas.openxmlformats.org/officeDocument/2006/relationships" xmlns:p="http://schemas.openxmlformats.org/presentationml/2006/main">
   <p:cSld>
     <p:spTree>
       <p:nvGrpSpPr>
-        <p:cNvPr id="59" name="Shape 59"/>
+        <p:cNvPr id="1" name="Shape 59"/>
         <p:cNvGrpSpPr/>
         <p:nvPr/>
       </p:nvGrpSpPr>
@@ -5626,14 +5816,16 @@
       <p:sp>
         <p:nvSpPr>
           <p:cNvPr id="60" name="Google Shape;60;p14"/>
-          <p:cNvSpPr txBox="1"/>
+          <p:cNvSpPr txBox="1">
+            <a:spLocks noGrp="1"/>
+          </p:cNvSpPr>
           <p:nvPr>
             <p:ph type="title"/>
           </p:nvPr>
         </p:nvSpPr>
         <p:spPr>
           <a:xfrm>
-            <a:off x="313500" y="507875"/>
+            <a:off x="311700" y="75712"/>
             <a:ext cx="8520600" cy="572700"/>
           </a:xfrm>
           <a:prstGeom prst="rect">
@@ -5641,12 +5833,12 @@
           </a:prstGeom>
         </p:spPr>
         <p:txBody>
-          <a:bodyPr anchorCtr="0" anchor="t" bIns="91425" lIns="91425" spcFirstLastPara="1" rIns="91425" wrap="square" tIns="91425">
+          <a:bodyPr spcFirstLastPara="1" wrap="square" lIns="91425" tIns="91425" rIns="91425" bIns="91425" anchor="t" anchorCtr="0">
             <a:noAutofit/>
           </a:bodyPr>
           <a:lstStyle/>
           <a:p>
-            <a:pPr indent="0" lvl="0" marL="0" rtl="0" algn="l">
+            <a:pPr marL="0" lvl="0" indent="0" algn="l" rtl="0">
               <a:spcBef>
                 <a:spcPts val="0"/>
               </a:spcBef>
@@ -5656,18 +5848,21 @@
               <a:buNone/>
             </a:pPr>
             <a:r>
-              <a:t/>
+              <a:rPr lang="en-US" dirty="0"/>
+              <a:t>Initial Budget</a:t>
             </a:r>
-            <a:endParaRPr/>
+            <a:endParaRPr dirty="0"/>
           </a:p>
         </p:txBody>
       </p:sp>
       <p:sp>
         <p:nvSpPr>
           <p:cNvPr id="61" name="Google Shape;61;p14"/>
-          <p:cNvSpPr txBox="1"/>
+          <p:cNvSpPr txBox="1">
+            <a:spLocks noGrp="1"/>
+          </p:cNvSpPr>
           <p:nvPr>
-            <p:ph idx="1" type="body"/>
+            <p:ph type="body" idx="1"/>
           </p:nvPr>
         </p:nvSpPr>
         <p:spPr>
@@ -5680,12 +5875,12 @@
           </a:prstGeom>
         </p:spPr>
         <p:txBody>
-          <a:bodyPr anchorCtr="0" anchor="t" bIns="91425" lIns="91425" spcFirstLastPara="1" rIns="91425" wrap="square" tIns="91425">
+          <a:bodyPr spcFirstLastPara="1" wrap="square" lIns="91425" tIns="91425" rIns="91425" bIns="91425" anchor="t" anchorCtr="0">
             <a:noAutofit/>
           </a:bodyPr>
           <a:lstStyle/>
           <a:p>
-            <a:pPr indent="0" lvl="0" marL="0" rtl="0" algn="l">
+            <a:pPr marL="0" lvl="0" indent="0" algn="l" rtl="0">
               <a:spcBef>
                 <a:spcPts val="0"/>
               </a:spcBef>
@@ -5694,9 +5889,6 @@
               </a:spcAft>
               <a:buNone/>
             </a:pPr>
-            <a:r>
-              <a:t/>
-            </a:r>
             <a:endParaRPr/>
           </a:p>
         </p:txBody>
@@ -5721,12 +5913,12 @@
           </a:ln>
         </p:spPr>
         <p:txBody>
-          <a:bodyPr anchorCtr="0" anchor="t" bIns="91425" lIns="91425" spcFirstLastPara="1" rIns="91425" wrap="square" tIns="91425">
+          <a:bodyPr spcFirstLastPara="1" wrap="square" lIns="91425" tIns="91425" rIns="91425" bIns="91425" anchor="t" anchorCtr="0">
             <a:noAutofit/>
           </a:bodyPr>
           <a:lstStyle/>
           <a:p>
-            <a:pPr indent="0" lvl="0" marL="0" rtl="0" algn="l">
+            <a:pPr marL="0" lvl="0" indent="0" algn="l" rtl="0">
               <a:lnSpc>
                 <a:spcPct val="115000"/>
               </a:lnSpc>
@@ -5738,9 +5930,6 @@
               </a:spcAft>
               <a:buNone/>
             </a:pPr>
-            <a:r>
-              <a:t/>
-            </a:r>
             <a:endParaRPr sz="1300">
               <a:solidFill>
                 <a:srgbClr val="595959"/>
@@ -5845,8 +6034,402 @@
 </p:sld>
 </file>
 
+<file path=ppt/slides/slide3.xml><?xml version="1.0" encoding="utf-8"?>
+<p:sld xmlns:a="http://schemas.openxmlformats.org/drawingml/2006/main" xmlns:r="http://schemas.openxmlformats.org/officeDocument/2006/relationships" xmlns:p="http://schemas.openxmlformats.org/presentationml/2006/main">
+  <p:cSld>
+    <p:spTree>
+      <p:nvGrpSpPr>
+        <p:cNvPr id="1" name=""/>
+        <p:cNvGrpSpPr/>
+        <p:nvPr/>
+      </p:nvGrpSpPr>
+      <p:grpSpPr>
+        <a:xfrm>
+          <a:off x="0" y="0"/>
+          <a:ext cx="0" cy="0"/>
+          <a:chOff x="0" y="0"/>
+          <a:chExt cx="0" cy="0"/>
+        </a:xfrm>
+      </p:grpSpPr>
+      <p:sp>
+        <p:nvSpPr>
+          <p:cNvPr id="2" name="Title 1">
+            <a:extLst>
+              <a:ext uri="{FF2B5EF4-FFF2-40B4-BE49-F238E27FC236}">
+                <a16:creationId xmlns:a16="http://schemas.microsoft.com/office/drawing/2014/main" id="{EBF1AEEF-E5FF-4073-B9FA-DA8EE0227D68}"/>
+              </a:ext>
+            </a:extLst>
+          </p:cNvPr>
+          <p:cNvSpPr>
+            <a:spLocks noGrp="1"/>
+          </p:cNvSpPr>
+          <p:nvPr>
+            <p:ph type="title"/>
+          </p:nvPr>
+        </p:nvSpPr>
+        <p:spPr/>
+        <p:txBody>
+          <a:bodyPr/>
+          <a:lstStyle/>
+          <a:p>
+            <a:r>
+              <a:rPr lang="en-US" dirty="0"/>
+              <a:t>Final Budget</a:t>
+            </a:r>
+          </a:p>
+        </p:txBody>
+      </p:sp>
+      <p:sp>
+        <p:nvSpPr>
+          <p:cNvPr id="3" name="Text Placeholder 2">
+            <a:extLst>
+              <a:ext uri="{FF2B5EF4-FFF2-40B4-BE49-F238E27FC236}">
+                <a16:creationId xmlns:a16="http://schemas.microsoft.com/office/drawing/2014/main" id="{CEF0F717-8EF2-42FD-A7C4-34EA71EB8998}"/>
+              </a:ext>
+            </a:extLst>
+          </p:cNvPr>
+          <p:cNvSpPr>
+            <a:spLocks noGrp="1"/>
+          </p:cNvSpPr>
+          <p:nvPr>
+            <p:ph type="body" idx="1"/>
+          </p:nvPr>
+        </p:nvSpPr>
+        <p:spPr/>
+        <p:txBody>
+          <a:bodyPr/>
+          <a:lstStyle/>
+          <a:p>
+            <a:endParaRPr lang="en-US"/>
+          </a:p>
+        </p:txBody>
+      </p:sp>
+      <p:pic>
+        <p:nvPicPr>
+          <p:cNvPr id="4" name="Picture 3">
+            <a:extLst>
+              <a:ext uri="{FF2B5EF4-FFF2-40B4-BE49-F238E27FC236}">
+                <a16:creationId xmlns:a16="http://schemas.microsoft.com/office/drawing/2014/main" id="{DC48233A-DB86-422D-BB70-75CABA20DF6A}"/>
+              </a:ext>
+            </a:extLst>
+          </p:cNvPr>
+          <p:cNvPicPr>
+            <a:picLocks noChangeAspect="1"/>
+          </p:cNvPicPr>
+          <p:nvPr/>
+        </p:nvPicPr>
+        <p:blipFill>
+          <a:blip r:embed="rId2"/>
+          <a:stretch>
+            <a:fillRect/>
+          </a:stretch>
+        </p:blipFill>
+        <p:spPr>
+          <a:xfrm>
+            <a:off x="846534" y="1076554"/>
+            <a:ext cx="7450931" cy="3740279"/>
+          </a:xfrm>
+          <a:prstGeom prst="rect">
+            <a:avLst/>
+          </a:prstGeom>
+        </p:spPr>
+      </p:pic>
+    </p:spTree>
+    <p:extLst>
+      <p:ext uri="{BB962C8B-B14F-4D97-AF65-F5344CB8AC3E}">
+        <p14:creationId xmlns:p14="http://schemas.microsoft.com/office/powerpoint/2010/main" val="565209730"/>
+      </p:ext>
+    </p:extLst>
+  </p:cSld>
+  <p:clrMapOvr>
+    <a:masterClrMapping/>
+  </p:clrMapOvr>
+</p:sld>
+</file>
+
 <file path=ppt/theme/theme1.xml><?xml version="1.0" encoding="utf-8"?>
-<a:theme xmlns:a="http://schemas.openxmlformats.org/drawingml/2006/main" xmlns:r="http://schemas.openxmlformats.org/officeDocument/2006/relationships">
+<a:theme xmlns:a="http://schemas.openxmlformats.org/drawingml/2006/main" name="Simple Light">
+  <a:themeElements>
+    <a:clrScheme name="Simple Light">
+      <a:dk1>
+        <a:srgbClr val="000000"/>
+      </a:dk1>
+      <a:lt1>
+        <a:srgbClr val="FFFFFF"/>
+      </a:lt1>
+      <a:dk2>
+        <a:srgbClr val="595959"/>
+      </a:dk2>
+      <a:lt2>
+        <a:srgbClr val="EEEEEE"/>
+      </a:lt2>
+      <a:accent1>
+        <a:srgbClr val="FFAB40"/>
+      </a:accent1>
+      <a:accent2>
+        <a:srgbClr val="212121"/>
+      </a:accent2>
+      <a:accent3>
+        <a:srgbClr val="78909C"/>
+      </a:accent3>
+      <a:accent4>
+        <a:srgbClr val="FFAB40"/>
+      </a:accent4>
+      <a:accent5>
+        <a:srgbClr val="0097A7"/>
+      </a:accent5>
+      <a:accent6>
+        <a:srgbClr val="EEFF41"/>
+      </a:accent6>
+      <a:hlink>
+        <a:srgbClr val="0097A7"/>
+      </a:hlink>
+      <a:folHlink>
+        <a:srgbClr val="0097A7"/>
+      </a:folHlink>
+    </a:clrScheme>
+    <a:fontScheme name="Office">
+      <a:majorFont>
+        <a:latin typeface="Arial"/>
+        <a:ea typeface=""/>
+        <a:cs typeface=""/>
+        <a:font script="Jpan" typeface="ＭＳ Ｐゴシック"/>
+        <a:font script="Hang" typeface="맑은 고딕"/>
+        <a:font script="Hans" typeface="宋体"/>
+        <a:font script="Hant" typeface="新細明體"/>
+        <a:font script="Arab" typeface="Times New Roman"/>
+        <a:font script="Hebr" typeface="Times New Roman"/>
+        <a:font script="Thai" typeface="Angsana New"/>
+        <a:font script="Ethi" typeface="Nyala"/>
+        <a:font script="Beng" typeface="Vrinda"/>
+        <a:font script="Gujr" typeface="Shruti"/>
+        <a:font script="Khmr" typeface="MoolBoran"/>
+        <a:font script="Knda" typeface="Tunga"/>
+        <a:font script="Guru" typeface="Raavi"/>
+        <a:font script="Cans" typeface="Euphemia"/>
+        <a:font script="Cher" typeface="Plantagenet Cherokee"/>
+        <a:font script="Yiii" typeface="Microsoft Yi Baiti"/>
+        <a:font script="Tibt" typeface="Microsoft Himalaya"/>
+        <a:font script="Thaa" typeface="MV Boli"/>
+        <a:font script="Deva" typeface="Mangal"/>
+        <a:font script="Telu" typeface="Gautami"/>
+        <a:font script="Taml" typeface="Latha"/>
+        <a:font script="Syrc" typeface="Estrangelo Edessa"/>
+        <a:font script="Orya" typeface="Kalinga"/>
+        <a:font script="Mlym" typeface="Kartika"/>
+        <a:font script="Laoo" typeface="DokChampa"/>
+        <a:font script="Sinh" typeface="Iskoola Pota"/>
+        <a:font script="Mong" typeface="Mongolian Baiti"/>
+        <a:font script="Viet" typeface="Times New Roman"/>
+        <a:font script="Uigh" typeface="Microsoft Uighur"/>
+        <a:font script="Geor" typeface="Sylfaen"/>
+      </a:majorFont>
+      <a:minorFont>
+        <a:latin typeface="Arial"/>
+        <a:ea typeface=""/>
+        <a:cs typeface=""/>
+        <a:font script="Jpan" typeface="ＭＳ Ｐゴシック"/>
+        <a:font script="Hang" typeface="맑은 고딕"/>
+        <a:font script="Hans" typeface="宋体"/>
+        <a:font script="Hant" typeface="新細明體"/>
+        <a:font script="Arab" typeface="Arial"/>
+        <a:font script="Hebr" typeface="Arial"/>
+        <a:font script="Thai" typeface="Cordia New"/>
+        <a:font script="Ethi" typeface="Nyala"/>
+        <a:font script="Beng" typeface="Vrinda"/>
+        <a:font script="Gujr" typeface="Shruti"/>
+        <a:font script="Khmr" typeface="DaunPenh"/>
+        <a:font script="Knda" typeface="Tunga"/>
+        <a:font script="Guru" typeface="Raavi"/>
+        <a:font script="Cans" typeface="Euphemia"/>
+        <a:font script="Cher" typeface="Plantagenet Cherokee"/>
+        <a:font script="Yiii" typeface="Microsoft Yi Baiti"/>
+        <a:font script="Tibt" typeface="Microsoft Himalaya"/>
+        <a:font script="Thaa" typeface="MV Boli"/>
+        <a:font script="Deva" typeface="Mangal"/>
+        <a:font script="Telu" typeface="Gautami"/>
+        <a:font script="Taml" typeface="Latha"/>
+        <a:font script="Syrc" typeface="Estrangelo Edessa"/>
+        <a:font script="Orya" typeface="Kalinga"/>
+        <a:font script="Mlym" typeface="Kartika"/>
+        <a:font script="Laoo" typeface="DokChampa"/>
+        <a:font script="Sinh" typeface="Iskoola Pota"/>
+        <a:font script="Mong" typeface="Mongolian Baiti"/>
+        <a:font script="Viet" typeface="Arial"/>
+        <a:font script="Uigh" typeface="Microsoft Uighur"/>
+        <a:font script="Geor" typeface="Sylfaen"/>
+      </a:minorFont>
+    </a:fontScheme>
+    <a:fmtScheme name="Office">
+      <a:fillStyleLst>
+        <a:solidFill>
+          <a:schemeClr val="phClr"/>
+        </a:solidFill>
+        <a:gradFill rotWithShape="1">
+          <a:gsLst>
+            <a:gs pos="0">
+              <a:schemeClr val="phClr">
+                <a:tint val="50000"/>
+                <a:satMod val="300000"/>
+              </a:schemeClr>
+            </a:gs>
+            <a:gs pos="35000">
+              <a:schemeClr val="phClr">
+                <a:tint val="37000"/>
+                <a:satMod val="300000"/>
+              </a:schemeClr>
+            </a:gs>
+            <a:gs pos="100000">
+              <a:schemeClr val="phClr">
+                <a:tint val="15000"/>
+                <a:satMod val="350000"/>
+              </a:schemeClr>
+            </a:gs>
+          </a:gsLst>
+          <a:lin ang="16200000" scaled="1"/>
+        </a:gradFill>
+        <a:gradFill rotWithShape="1">
+          <a:gsLst>
+            <a:gs pos="0">
+              <a:schemeClr val="phClr">
+                <a:tint val="100000"/>
+                <a:shade val="100000"/>
+                <a:satMod val="130000"/>
+              </a:schemeClr>
+            </a:gs>
+            <a:gs pos="100000">
+              <a:schemeClr val="phClr">
+                <a:tint val="50000"/>
+                <a:shade val="100000"/>
+                <a:satMod val="350000"/>
+              </a:schemeClr>
+            </a:gs>
+          </a:gsLst>
+          <a:lin ang="16200000" scaled="0"/>
+        </a:gradFill>
+      </a:fillStyleLst>
+      <a:lnStyleLst>
+        <a:ln w="9525" cap="flat" cmpd="sng" algn="ctr">
+          <a:solidFill>
+            <a:schemeClr val="phClr">
+              <a:shade val="95000"/>
+              <a:satMod val="105000"/>
+            </a:schemeClr>
+          </a:solidFill>
+          <a:prstDash val="solid"/>
+        </a:ln>
+        <a:ln w="25400" cap="flat" cmpd="sng" algn="ctr">
+          <a:solidFill>
+            <a:schemeClr val="phClr"/>
+          </a:solidFill>
+          <a:prstDash val="solid"/>
+        </a:ln>
+        <a:ln w="38100" cap="flat" cmpd="sng" algn="ctr">
+          <a:solidFill>
+            <a:schemeClr val="phClr"/>
+          </a:solidFill>
+          <a:prstDash val="solid"/>
+        </a:ln>
+      </a:lnStyleLst>
+      <a:effectStyleLst>
+        <a:effectStyle>
+          <a:effectLst>
+            <a:outerShdw blurRad="40000" dist="20000" dir="5400000" rotWithShape="0">
+              <a:srgbClr val="000000">
+                <a:alpha val="38000"/>
+              </a:srgbClr>
+            </a:outerShdw>
+          </a:effectLst>
+        </a:effectStyle>
+        <a:effectStyle>
+          <a:effectLst>
+            <a:outerShdw blurRad="40000" dist="23000" dir="5400000" rotWithShape="0">
+              <a:srgbClr val="000000">
+                <a:alpha val="35000"/>
+              </a:srgbClr>
+            </a:outerShdw>
+          </a:effectLst>
+        </a:effectStyle>
+        <a:effectStyle>
+          <a:effectLst>
+            <a:outerShdw blurRad="40000" dist="23000" dir="5400000" rotWithShape="0">
+              <a:srgbClr val="000000">
+                <a:alpha val="35000"/>
+              </a:srgbClr>
+            </a:outerShdw>
+          </a:effectLst>
+          <a:scene3d>
+            <a:camera prst="orthographicFront">
+              <a:rot lat="0" lon="0" rev="0"/>
+            </a:camera>
+            <a:lightRig rig="threePt" dir="t">
+              <a:rot lat="0" lon="0" rev="1200000"/>
+            </a:lightRig>
+          </a:scene3d>
+          <a:sp3d>
+            <a:bevelT w="63500" h="25400"/>
+          </a:sp3d>
+        </a:effectStyle>
+      </a:effectStyleLst>
+      <a:bgFillStyleLst>
+        <a:solidFill>
+          <a:schemeClr val="phClr"/>
+        </a:solidFill>
+        <a:gradFill rotWithShape="1">
+          <a:gsLst>
+            <a:gs pos="0">
+              <a:schemeClr val="phClr">
+                <a:tint val="40000"/>
+                <a:satMod val="350000"/>
+              </a:schemeClr>
+            </a:gs>
+            <a:gs pos="40000">
+              <a:schemeClr val="phClr">
+                <a:tint val="45000"/>
+                <a:shade val="99000"/>
+                <a:satMod val="350000"/>
+              </a:schemeClr>
+            </a:gs>
+            <a:gs pos="100000">
+              <a:schemeClr val="phClr">
+                <a:shade val="20000"/>
+                <a:satMod val="255000"/>
+              </a:schemeClr>
+            </a:gs>
+          </a:gsLst>
+          <a:path path="circle">
+            <a:fillToRect l="50000" t="-80000" r="50000" b="180000"/>
+          </a:path>
+        </a:gradFill>
+        <a:gradFill rotWithShape="1">
+          <a:gsLst>
+            <a:gs pos="0">
+              <a:schemeClr val="phClr">
+                <a:tint val="80000"/>
+                <a:satMod val="300000"/>
+              </a:schemeClr>
+            </a:gs>
+            <a:gs pos="100000">
+              <a:schemeClr val="phClr">
+                <a:shade val="30000"/>
+                <a:satMod val="200000"/>
+              </a:schemeClr>
+            </a:gs>
+          </a:gsLst>
+          <a:path path="circle">
+            <a:fillToRect l="50000" t="50000" r="50000" b="50000"/>
+          </a:path>
+        </a:gradFill>
+      </a:bgFillStyleLst>
+    </a:fmtScheme>
+  </a:themeElements>
+  <a:objectDefaults/>
+  <a:extraClrSchemeLst/>
+</a:theme>
+</file>
+
+<file path=ppt/theme/theme2.xml><?xml version="1.0" encoding="utf-8"?>
+<a:theme xmlns:a="http://schemas.openxmlformats.org/drawingml/2006/main">
   <a:themeElements>
     <a:clrScheme name="Default">
       <a:dk1>
@@ -6121,284 +6704,7 @@
       </a:bgFillStyleLst>
     </a:fmtScheme>
   </a:themeElements>
-</a:theme>
-</file>
-
-<file path=ppt/theme/theme2.xml><?xml version="1.0" encoding="utf-8"?>
-<a:theme xmlns:a="http://schemas.openxmlformats.org/drawingml/2006/main" xmlns:r="http://schemas.openxmlformats.org/officeDocument/2006/relationships" name="Simple Light">
-  <a:themeElements>
-    <a:clrScheme name="Simple Light">
-      <a:dk1>
-        <a:srgbClr val="000000"/>
-      </a:dk1>
-      <a:lt1>
-        <a:srgbClr val="FFFFFF"/>
-      </a:lt1>
-      <a:dk2>
-        <a:srgbClr val="595959"/>
-      </a:dk2>
-      <a:lt2>
-        <a:srgbClr val="EEEEEE"/>
-      </a:lt2>
-      <a:accent1>
-        <a:srgbClr val="FFAB40"/>
-      </a:accent1>
-      <a:accent2>
-        <a:srgbClr val="212121"/>
-      </a:accent2>
-      <a:accent3>
-        <a:srgbClr val="78909C"/>
-      </a:accent3>
-      <a:accent4>
-        <a:srgbClr val="FFAB40"/>
-      </a:accent4>
-      <a:accent5>
-        <a:srgbClr val="0097A7"/>
-      </a:accent5>
-      <a:accent6>
-        <a:srgbClr val="EEFF41"/>
-      </a:accent6>
-      <a:hlink>
-        <a:srgbClr val="0097A7"/>
-      </a:hlink>
-      <a:folHlink>
-        <a:srgbClr val="0097A7"/>
-      </a:folHlink>
-    </a:clrScheme>
-    <a:fontScheme name="Office">
-      <a:majorFont>
-        <a:latin typeface="Arial"/>
-        <a:ea typeface=""/>
-        <a:cs typeface=""/>
-        <a:font script="Jpan" typeface="ＭＳ Ｐゴシック"/>
-        <a:font script="Hang" typeface="맑은 고딕"/>
-        <a:font script="Hans" typeface="宋体"/>
-        <a:font script="Hant" typeface="新細明體"/>
-        <a:font script="Arab" typeface="Times New Roman"/>
-        <a:font script="Hebr" typeface="Times New Roman"/>
-        <a:font script="Thai" typeface="Angsana New"/>
-        <a:font script="Ethi" typeface="Nyala"/>
-        <a:font script="Beng" typeface="Vrinda"/>
-        <a:font script="Gujr" typeface="Shruti"/>
-        <a:font script="Khmr" typeface="MoolBoran"/>
-        <a:font script="Knda" typeface="Tunga"/>
-        <a:font script="Guru" typeface="Raavi"/>
-        <a:font script="Cans" typeface="Euphemia"/>
-        <a:font script="Cher" typeface="Plantagenet Cherokee"/>
-        <a:font script="Yiii" typeface="Microsoft Yi Baiti"/>
-        <a:font script="Tibt" typeface="Microsoft Himalaya"/>
-        <a:font script="Thaa" typeface="MV Boli"/>
-        <a:font script="Deva" typeface="Mangal"/>
-        <a:font script="Telu" typeface="Gautami"/>
-        <a:font script="Taml" typeface="Latha"/>
-        <a:font script="Syrc" typeface="Estrangelo Edessa"/>
-        <a:font script="Orya" typeface="Kalinga"/>
-        <a:font script="Mlym" typeface="Kartika"/>
-        <a:font script="Laoo" typeface="DokChampa"/>
-        <a:font script="Sinh" typeface="Iskoola Pota"/>
-        <a:font script="Mong" typeface="Mongolian Baiti"/>
-        <a:font script="Viet" typeface="Times New Roman"/>
-        <a:font script="Uigh" typeface="Microsoft Uighur"/>
-        <a:font script="Geor" typeface="Sylfaen"/>
-      </a:majorFont>
-      <a:minorFont>
-        <a:latin typeface="Arial"/>
-        <a:ea typeface=""/>
-        <a:cs typeface=""/>
-        <a:font script="Jpan" typeface="ＭＳ Ｐゴシック"/>
-        <a:font script="Hang" typeface="맑은 고딕"/>
-        <a:font script="Hans" typeface="宋体"/>
-        <a:font script="Hant" typeface="新細明體"/>
-        <a:font script="Arab" typeface="Arial"/>
-        <a:font script="Hebr" typeface="Arial"/>
-        <a:font script="Thai" typeface="Cordia New"/>
-        <a:font script="Ethi" typeface="Nyala"/>
-        <a:font script="Beng" typeface="Vrinda"/>
-        <a:font script="Gujr" typeface="Shruti"/>
-        <a:font script="Khmr" typeface="DaunPenh"/>
-        <a:font script="Knda" typeface="Tunga"/>
-        <a:font script="Guru" typeface="Raavi"/>
-        <a:font script="Cans" typeface="Euphemia"/>
-        <a:font script="Cher" typeface="Plantagenet Cherokee"/>
-        <a:font script="Yiii" typeface="Microsoft Yi Baiti"/>
-        <a:font script="Tibt" typeface="Microsoft Himalaya"/>
-        <a:font script="Thaa" typeface="MV Boli"/>
-        <a:font script="Deva" typeface="Mangal"/>
-        <a:font script="Telu" typeface="Gautami"/>
-        <a:font script="Taml" typeface="Latha"/>
-        <a:font script="Syrc" typeface="Estrangelo Edessa"/>
-        <a:font script="Orya" typeface="Kalinga"/>
-        <a:font script="Mlym" typeface="Kartika"/>
-        <a:font script="Laoo" typeface="DokChampa"/>
-        <a:font script="Sinh" typeface="Iskoola Pota"/>
-        <a:font script="Mong" typeface="Mongolian Baiti"/>
-        <a:font script="Viet" typeface="Arial"/>
-        <a:font script="Uigh" typeface="Microsoft Uighur"/>
-        <a:font script="Geor" typeface="Sylfaen"/>
-      </a:minorFont>
-    </a:fontScheme>
-    <a:fmtScheme name="Office">
-      <a:fillStyleLst>
-        <a:solidFill>
-          <a:schemeClr val="phClr"/>
-        </a:solidFill>
-        <a:gradFill rotWithShape="1">
-          <a:gsLst>
-            <a:gs pos="0">
-              <a:schemeClr val="phClr">
-                <a:tint val="50000"/>
-                <a:satMod val="300000"/>
-              </a:schemeClr>
-            </a:gs>
-            <a:gs pos="35000">
-              <a:schemeClr val="phClr">
-                <a:tint val="37000"/>
-                <a:satMod val="300000"/>
-              </a:schemeClr>
-            </a:gs>
-            <a:gs pos="100000">
-              <a:schemeClr val="phClr">
-                <a:tint val="15000"/>
-                <a:satMod val="350000"/>
-              </a:schemeClr>
-            </a:gs>
-          </a:gsLst>
-          <a:lin ang="16200000" scaled="1"/>
-        </a:gradFill>
-        <a:gradFill rotWithShape="1">
-          <a:gsLst>
-            <a:gs pos="0">
-              <a:schemeClr val="phClr">
-                <a:tint val="100000"/>
-                <a:shade val="100000"/>
-                <a:satMod val="130000"/>
-              </a:schemeClr>
-            </a:gs>
-            <a:gs pos="100000">
-              <a:schemeClr val="phClr">
-                <a:tint val="50000"/>
-                <a:shade val="100000"/>
-                <a:satMod val="350000"/>
-              </a:schemeClr>
-            </a:gs>
-          </a:gsLst>
-          <a:lin ang="16200000" scaled="0"/>
-        </a:gradFill>
-      </a:fillStyleLst>
-      <a:lnStyleLst>
-        <a:ln w="9525" cap="flat" cmpd="sng" algn="ctr">
-          <a:solidFill>
-            <a:schemeClr val="phClr">
-              <a:shade val="95000"/>
-              <a:satMod val="105000"/>
-            </a:schemeClr>
-          </a:solidFill>
-          <a:prstDash val="solid"/>
-        </a:ln>
-        <a:ln w="25400" cap="flat" cmpd="sng" algn="ctr">
-          <a:solidFill>
-            <a:schemeClr val="phClr"/>
-          </a:solidFill>
-          <a:prstDash val="solid"/>
-        </a:ln>
-        <a:ln w="38100" cap="flat" cmpd="sng" algn="ctr">
-          <a:solidFill>
-            <a:schemeClr val="phClr"/>
-          </a:solidFill>
-          <a:prstDash val="solid"/>
-        </a:ln>
-      </a:lnStyleLst>
-      <a:effectStyleLst>
-        <a:effectStyle>
-          <a:effectLst>
-            <a:outerShdw blurRad="40000" dist="20000" dir="5400000" rotWithShape="0">
-              <a:srgbClr val="000000">
-                <a:alpha val="38000"/>
-              </a:srgbClr>
-            </a:outerShdw>
-          </a:effectLst>
-        </a:effectStyle>
-        <a:effectStyle>
-          <a:effectLst>
-            <a:outerShdw blurRad="40000" dist="23000" dir="5400000" rotWithShape="0">
-              <a:srgbClr val="000000">
-                <a:alpha val="35000"/>
-              </a:srgbClr>
-            </a:outerShdw>
-          </a:effectLst>
-        </a:effectStyle>
-        <a:effectStyle>
-          <a:effectLst>
-            <a:outerShdw blurRad="40000" dist="23000" dir="5400000" rotWithShape="0">
-              <a:srgbClr val="000000">
-                <a:alpha val="35000"/>
-              </a:srgbClr>
-            </a:outerShdw>
-          </a:effectLst>
-          <a:scene3d>
-            <a:camera prst="orthographicFront">
-              <a:rot lat="0" lon="0" rev="0"/>
-            </a:camera>
-            <a:lightRig rig="threePt" dir="t">
-              <a:rot lat="0" lon="0" rev="1200000"/>
-            </a:lightRig>
-          </a:scene3d>
-          <a:sp3d>
-            <a:bevelT w="63500" h="25400"/>
-          </a:sp3d>
-        </a:effectStyle>
-      </a:effectStyleLst>
-      <a:bgFillStyleLst>
-        <a:solidFill>
-          <a:schemeClr val="phClr"/>
-        </a:solidFill>
-        <a:gradFill rotWithShape="1">
-          <a:gsLst>
-            <a:gs pos="0">
-              <a:schemeClr val="phClr">
-                <a:tint val="40000"/>
-                <a:satMod val="350000"/>
-              </a:schemeClr>
-            </a:gs>
-            <a:gs pos="40000">
-              <a:schemeClr val="phClr">
-                <a:tint val="45000"/>
-                <a:shade val="99000"/>
-                <a:satMod val="350000"/>
-              </a:schemeClr>
-            </a:gs>
-            <a:gs pos="100000">
-              <a:schemeClr val="phClr">
-                <a:shade val="20000"/>
-                <a:satMod val="255000"/>
-              </a:schemeClr>
-            </a:gs>
-          </a:gsLst>
-          <a:path path="circle">
-            <a:fillToRect l="50000" t="-80000" r="50000" b="180000"/>
-          </a:path>
-        </a:gradFill>
-        <a:gradFill rotWithShape="1">
-          <a:gsLst>
-            <a:gs pos="0">
-              <a:schemeClr val="phClr">
-                <a:tint val="80000"/>
-                <a:satMod val="300000"/>
-              </a:schemeClr>
-            </a:gs>
-            <a:gs pos="100000">
-              <a:schemeClr val="phClr">
-                <a:shade val="30000"/>
-                <a:satMod val="200000"/>
-              </a:schemeClr>
-            </a:gs>
-          </a:gsLst>
-          <a:path path="circle">
-            <a:fillToRect l="50000" t="50000" r="50000" b="50000"/>
-          </a:path>
-        </a:gradFill>
-      </a:bgFillStyleLst>
-    </a:fmtScheme>
-  </a:themeElements>
+  <a:objectDefaults/>
+  <a:extraClrSchemeLst/>
 </a:theme>
 </file>
</xml_diff>